<commit_message>
PwC - Digital Intelligence - Task 5 - Model Answers Updated
</commit_message>
<xml_diff>
--- a/PWC - Digital Intelligence/Task 5 - Predictive Health Care/Task_5_Predictive_Health_Care.pptx
+++ b/PWC - Digital Intelligence/Task 5 - Predictive Health Care/Task_5_Predictive_Health_Care.pptx
@@ -6,6 +6,7 @@
   </p:sldMasterIdLst>
   <p:sldIdLst>
     <p:sldId id="256" r:id="rId2"/>
+    <p:sldId id="257" r:id="rId3"/>
   </p:sldIdLst>
   <p:sldSz cx="12192000" cy="6858000"/>
   <p:notesSz cx="6858000" cy="9144000"/>
@@ -104,6 +105,11 @@
       </a:defRPr>
     </a:lvl9pPr>
   </p:defaultTextStyle>
+  <p:extLst>
+    <p:ext uri="{EFAFB233-063F-42B5-8137-9DF3F51BA10A}">
+      <p15:sldGuideLst xmlns:p15="http://schemas.microsoft.com/office/powerpoint/2012/main"/>
+    </p:ext>
+  </p:extLst>
 </p:presentation>
 </file>
 
@@ -3341,6 +3347,112 @@
           <a:chExt cx="0" cy="0"/>
         </a:xfrm>
       </p:grpSpPr>
+      <p:sp>
+        <p:nvSpPr>
+          <p:cNvPr id="2" name="TextBox 1">
+            <a:extLst>
+              <a:ext uri="{FF2B5EF4-FFF2-40B4-BE49-F238E27FC236}">
+                <a16:creationId xmlns:a16="http://schemas.microsoft.com/office/drawing/2014/main" id="{9B0AEACA-6FB6-27ED-3750-21931965B2EB}"/>
+              </a:ext>
+            </a:extLst>
+          </p:cNvPr>
+          <p:cNvSpPr txBox="1"/>
+          <p:nvPr/>
+        </p:nvSpPr>
+        <p:spPr>
+          <a:xfrm>
+            <a:off x="2071396" y="746314"/>
+            <a:ext cx="7483151" cy="1446550"/>
+          </a:xfrm>
+          <a:prstGeom prst="rect">
+            <a:avLst/>
+          </a:prstGeom>
+          <a:noFill/>
+        </p:spPr>
+        <p:txBody>
+          <a:bodyPr wrap="square" rtlCol="0" anchor="ctr">
+            <a:spAutoFit/>
+          </a:bodyPr>
+          <a:lstStyle/>
+          <a:p>
+            <a:pPr algn="ctr"/>
+            <a:r>
+              <a:rPr lang="en-US" sz="3200" b="1" dirty="0">
+                <a:solidFill>
+                  <a:schemeClr val="accent1">
+                    <a:lumMod val="50000"/>
+                  </a:schemeClr>
+                </a:solidFill>
+              </a:rPr>
+              <a:t>Task 5 – Predictive Health Care</a:t>
+            </a:r>
+          </a:p>
+          <a:p>
+            <a:pPr algn="ctr"/>
+            <a:endParaRPr lang="en-US" sz="3200" b="1" dirty="0">
+              <a:solidFill>
+                <a:schemeClr val="accent1">
+                  <a:lumMod val="50000"/>
+                </a:schemeClr>
+              </a:solidFill>
+            </a:endParaRPr>
+          </a:p>
+          <a:p>
+            <a:pPr algn="ctr"/>
+            <a:r>
+              <a:rPr lang="en-US" sz="2400" b="1" dirty="0">
+                <a:solidFill>
+                  <a:schemeClr val="accent1">
+                    <a:lumMod val="50000"/>
+                  </a:schemeClr>
+                </a:solidFill>
+              </a:rPr>
+              <a:t>Comparing Adverse Effects of Medication</a:t>
+            </a:r>
+          </a:p>
+        </p:txBody>
+      </p:sp>
+      <p:sp>
+        <p:nvSpPr>
+          <p:cNvPr id="4" name="TextBox 3">
+            <a:extLst>
+              <a:ext uri="{FF2B5EF4-FFF2-40B4-BE49-F238E27FC236}">
+                <a16:creationId xmlns:a16="http://schemas.microsoft.com/office/drawing/2014/main" id="{45B7BD62-2FB8-9C32-5B0F-5E0D1F970C83}"/>
+              </a:ext>
+            </a:extLst>
+          </p:cNvPr>
+          <p:cNvSpPr txBox="1"/>
+          <p:nvPr/>
+        </p:nvSpPr>
+        <p:spPr>
+          <a:xfrm>
+            <a:off x="8472196" y="5411755"/>
+            <a:ext cx="3275045" cy="584775"/>
+          </a:xfrm>
+          <a:prstGeom prst="rect">
+            <a:avLst/>
+          </a:prstGeom>
+          <a:noFill/>
+        </p:spPr>
+        <p:txBody>
+          <a:bodyPr wrap="square" rtlCol="0">
+            <a:spAutoFit/>
+          </a:bodyPr>
+          <a:lstStyle/>
+          <a:p>
+            <a:r>
+              <a:rPr lang="en-US" sz="1600" dirty="0"/>
+              <a:t>Akshay Paunikar (Data Scientist)</a:t>
+            </a:r>
+          </a:p>
+          <a:p>
+            <a:r>
+              <a:rPr lang="en-US" sz="1600" dirty="0"/>
+              <a:t>Jakob (Senior Data Scientist)</a:t>
+            </a:r>
+          </a:p>
+        </p:txBody>
+      </p:sp>
     </p:spTree>
     <p:extLst>
       <p:ext uri="{BB962C8B-B14F-4D97-AF65-F5344CB8AC3E}">
@@ -3351,18 +3463,120 @@
   <p:clrMapOvr>
     <a:masterClrMapping/>
   </p:clrMapOvr>
-  <mc:AlternateContent xmlns:mc="http://schemas.openxmlformats.org/markup-compatibility/2006">
-    <mc:Choice xmlns:p15="http://schemas.microsoft.com/office/powerpoint/2012/main" Requires="p15">
+  <mc:AlternateContent xmlns:mc="http://schemas.openxmlformats.org/markup-compatibility/2006" xmlns:p15="http://schemas.microsoft.com/office/powerpoint/2012/main">
+    <mc:Choice Requires="p15">
       <p:transition xmlns:p14="http://schemas.microsoft.com/office/powerpoint/2010/main" spd="slow" p14:dur="1250">
         <p15:prstTrans prst="pageCurlDouble"/>
       </p:transition>
     </mc:Choice>
-    <mc:Fallback>
+    <mc:Fallback xmlns="">
       <p:transition spd="slow">
         <p:fade/>
       </p:transition>
     </mc:Fallback>
   </mc:AlternateContent>
+</p:sld>
+</file>
+
+<file path=ppt/slides/slide2.xml><?xml version="1.0" encoding="utf-8"?>
+<p:sld xmlns:a="http://schemas.openxmlformats.org/drawingml/2006/main" xmlns:r="http://schemas.openxmlformats.org/officeDocument/2006/relationships" xmlns:p="http://schemas.openxmlformats.org/presentationml/2006/main">
+  <p:cSld>
+    <p:spTree>
+      <p:nvGrpSpPr>
+        <p:cNvPr id="1" name=""/>
+        <p:cNvGrpSpPr/>
+        <p:nvPr/>
+      </p:nvGrpSpPr>
+      <p:grpSpPr>
+        <a:xfrm>
+          <a:off x="0" y="0"/>
+          <a:ext cx="0" cy="0"/>
+          <a:chOff x="0" y="0"/>
+          <a:chExt cx="0" cy="0"/>
+        </a:xfrm>
+      </p:grpSpPr>
+      <p:sp>
+        <p:nvSpPr>
+          <p:cNvPr id="2" name="Title 1">
+            <a:extLst>
+              <a:ext uri="{FF2B5EF4-FFF2-40B4-BE49-F238E27FC236}">
+                <a16:creationId xmlns:a16="http://schemas.microsoft.com/office/drawing/2014/main" id="{23035FC4-15D0-7346-15B4-74B805538146}"/>
+              </a:ext>
+            </a:extLst>
+          </p:cNvPr>
+          <p:cNvSpPr>
+            <a:spLocks noGrp="1"/>
+          </p:cNvSpPr>
+          <p:nvPr>
+            <p:ph type="title"/>
+          </p:nvPr>
+        </p:nvSpPr>
+        <p:spPr>
+          <a:xfrm>
+            <a:off x="2177920" y="327804"/>
+            <a:ext cx="6997959" cy="595928"/>
+          </a:xfrm>
+        </p:spPr>
+        <p:txBody>
+          <a:bodyPr>
+            <a:noAutofit/>
+          </a:bodyPr>
+          <a:lstStyle/>
+          <a:p>
+            <a:pPr algn="ctr"/>
+            <a:r>
+              <a:rPr lang="en-US" sz="2800" dirty="0">
+                <a:solidFill>
+                  <a:schemeClr val="accent2">
+                    <a:lumMod val="75000"/>
+                  </a:schemeClr>
+                </a:solidFill>
+                <a:latin typeface="+mn-lt"/>
+              </a:rPr>
+              <a:t>Adverse Effects Comparison</a:t>
+            </a:r>
+          </a:p>
+        </p:txBody>
+      </p:sp>
+      <p:pic>
+        <p:nvPicPr>
+          <p:cNvPr id="5" name="Content Placeholder 4">
+            <a:extLst>
+              <a:ext uri="{FF2B5EF4-FFF2-40B4-BE49-F238E27FC236}">
+                <a16:creationId xmlns:a16="http://schemas.microsoft.com/office/drawing/2014/main" id="{FFC58701-524E-13DF-709B-C05BF93B55FB}"/>
+              </a:ext>
+            </a:extLst>
+          </p:cNvPr>
+          <p:cNvPicPr>
+            <a:picLocks noGrp="1" noChangeAspect="1"/>
+          </p:cNvPicPr>
+          <p:nvPr>
+            <p:ph idx="1"/>
+          </p:nvPr>
+        </p:nvPicPr>
+        <p:blipFill>
+          <a:blip r:embed="rId2"/>
+          <a:stretch>
+            <a:fillRect/>
+          </a:stretch>
+        </p:blipFill>
+        <p:spPr>
+          <a:xfrm>
+            <a:off x="-2" y="1826963"/>
+            <a:ext cx="12192001" cy="3528807"/>
+          </a:xfrm>
+        </p:spPr>
+      </p:pic>
+    </p:spTree>
+    <p:extLst>
+      <p:ext uri="{BB962C8B-B14F-4D97-AF65-F5344CB8AC3E}">
+        <p14:creationId xmlns:p14="http://schemas.microsoft.com/office/powerpoint/2010/main" val="1114372968"/>
+      </p:ext>
+    </p:extLst>
+  </p:cSld>
+  <p:clrMapOvr>
+    <a:masterClrMapping/>
+  </p:clrMapOvr>
 </p:sld>
 </file>
 

</xml_diff>

<commit_message>
PwC - Digital Intelligence - Task 5 - files updated
</commit_message>
<xml_diff>
--- a/PWC - Digital Intelligence/Task 5 - Predictive Health Care/Task_5_Predictive_Health_Care.pptx
+++ b/PWC - Digital Intelligence/Task 5 - Predictive Health Care/Task_5_Predictive_Health_Care.pptx
@@ -7,6 +7,9 @@
   <p:sldIdLst>
     <p:sldId id="256" r:id="rId2"/>
     <p:sldId id="257" r:id="rId3"/>
+    <p:sldId id="258" r:id="rId4"/>
+    <p:sldId id="259" r:id="rId5"/>
+    <p:sldId id="260" r:id="rId6"/>
   </p:sldIdLst>
   <p:sldSz cx="12192000" cy="6858000"/>
   <p:notesSz cx="6858000" cy="9144000"/>
@@ -260,7 +263,7 @@
           <a:p>
             <a:fld id="{36C54636-044B-43B3-945C-F79D55BA40FD}" type="datetimeFigureOut">
               <a:rPr lang="en-US" smtClean="0"/>
-              <a:t>12/19/2023</a:t>
+              <a:t>12/20/2023</a:t>
             </a:fld>
             <a:endParaRPr lang="en-US"/>
           </a:p>
@@ -458,7 +461,7 @@
           <a:p>
             <a:fld id="{36C54636-044B-43B3-945C-F79D55BA40FD}" type="datetimeFigureOut">
               <a:rPr lang="en-US" smtClean="0"/>
-              <a:t>12/19/2023</a:t>
+              <a:t>12/20/2023</a:t>
             </a:fld>
             <a:endParaRPr lang="en-US"/>
           </a:p>
@@ -666,7 +669,7 @@
           <a:p>
             <a:fld id="{36C54636-044B-43B3-945C-F79D55BA40FD}" type="datetimeFigureOut">
               <a:rPr lang="en-US" smtClean="0"/>
-              <a:t>12/19/2023</a:t>
+              <a:t>12/20/2023</a:t>
             </a:fld>
             <a:endParaRPr lang="en-US"/>
           </a:p>
@@ -864,7 +867,7 @@
           <a:p>
             <a:fld id="{36C54636-044B-43B3-945C-F79D55BA40FD}" type="datetimeFigureOut">
               <a:rPr lang="en-US" smtClean="0"/>
-              <a:t>12/19/2023</a:t>
+              <a:t>12/20/2023</a:t>
             </a:fld>
             <a:endParaRPr lang="en-US"/>
           </a:p>
@@ -1139,7 +1142,7 @@
           <a:p>
             <a:fld id="{36C54636-044B-43B3-945C-F79D55BA40FD}" type="datetimeFigureOut">
               <a:rPr lang="en-US" smtClean="0"/>
-              <a:t>12/19/2023</a:t>
+              <a:t>12/20/2023</a:t>
             </a:fld>
             <a:endParaRPr lang="en-US"/>
           </a:p>
@@ -1404,7 +1407,7 @@
           <a:p>
             <a:fld id="{36C54636-044B-43B3-945C-F79D55BA40FD}" type="datetimeFigureOut">
               <a:rPr lang="en-US" smtClean="0"/>
-              <a:t>12/19/2023</a:t>
+              <a:t>12/20/2023</a:t>
             </a:fld>
             <a:endParaRPr lang="en-US"/>
           </a:p>
@@ -1816,7 +1819,7 @@
           <a:p>
             <a:fld id="{36C54636-044B-43B3-945C-F79D55BA40FD}" type="datetimeFigureOut">
               <a:rPr lang="en-US" smtClean="0"/>
-              <a:t>12/19/2023</a:t>
+              <a:t>12/20/2023</a:t>
             </a:fld>
             <a:endParaRPr lang="en-US"/>
           </a:p>
@@ -1957,7 +1960,7 @@
           <a:p>
             <a:fld id="{36C54636-044B-43B3-945C-F79D55BA40FD}" type="datetimeFigureOut">
               <a:rPr lang="en-US" smtClean="0"/>
-              <a:t>12/19/2023</a:t>
+              <a:t>12/20/2023</a:t>
             </a:fld>
             <a:endParaRPr lang="en-US"/>
           </a:p>
@@ -2070,7 +2073,7 @@
           <a:p>
             <a:fld id="{36C54636-044B-43B3-945C-F79D55BA40FD}" type="datetimeFigureOut">
               <a:rPr lang="en-US" smtClean="0"/>
-              <a:t>12/19/2023</a:t>
+              <a:t>12/20/2023</a:t>
             </a:fld>
             <a:endParaRPr lang="en-US"/>
           </a:p>
@@ -2381,7 +2384,7 @@
           <a:p>
             <a:fld id="{36C54636-044B-43B3-945C-F79D55BA40FD}" type="datetimeFigureOut">
               <a:rPr lang="en-US" smtClean="0"/>
-              <a:t>12/19/2023</a:t>
+              <a:t>12/20/2023</a:t>
             </a:fld>
             <a:endParaRPr lang="en-US"/>
           </a:p>
@@ -2669,7 +2672,7 @@
           <a:p>
             <a:fld id="{36C54636-044B-43B3-945C-F79D55BA40FD}" type="datetimeFigureOut">
               <a:rPr lang="en-US" smtClean="0"/>
-              <a:t>12/19/2023</a:t>
+              <a:t>12/20/2023</a:t>
             </a:fld>
             <a:endParaRPr lang="en-US"/>
           </a:p>
@@ -2910,7 +2913,7 @@
           <a:p>
             <a:fld id="{36C54636-044B-43B3-945C-F79D55BA40FD}" type="datetimeFigureOut">
               <a:rPr lang="en-US" smtClean="0"/>
-              <a:t>12/19/2023</a:t>
+              <a:t>12/20/2023</a:t>
             </a:fld>
             <a:endParaRPr lang="en-US"/>
           </a:p>
@@ -3317,17 +3320,12 @@
       <p:bgPr>
         <a:blipFill dpi="0" rotWithShape="1">
           <a:blip r:embed="rId2">
-            <a:alphaModFix amt="48000"/>
+            <a:alphaModFix amt="79000"/>
             <a:lum/>
-            <a:extLst>
-              <a:ext uri="{837473B0-CC2E-450A-ABE3-18F120FF3D39}">
-                <a1611:picAttrSrcUrl xmlns:a1611="http://schemas.microsoft.com/office/drawing/2016/11/main" r:id="rId3"/>
-              </a:ext>
-            </a:extLst>
           </a:blip>
           <a:srcRect/>
           <a:stretch>
-            <a:fillRect/>
+            <a:fillRect t="-9000" b="-9000"/>
           </a:stretch>
         </a:blipFill>
         <a:effectLst/>
@@ -3352,7 +3350,7 @@
           <p:cNvPr id="2" name="TextBox 1">
             <a:extLst>
               <a:ext uri="{FF2B5EF4-FFF2-40B4-BE49-F238E27FC236}">
-                <a16:creationId xmlns:a16="http://schemas.microsoft.com/office/drawing/2014/main" id="{9B0AEACA-6FB6-27ED-3750-21931965B2EB}"/>
+                <a16:creationId xmlns:a16="http://schemas.microsoft.com/office/drawing/2014/main" id="{683D8414-9AA8-D3E2-0B71-FF167C342DAD}"/>
               </a:ext>
             </a:extLst>
           </p:cNvPr>
@@ -3361,8 +3359,8 @@
         </p:nvSpPr>
         <p:spPr>
           <a:xfrm>
-            <a:off x="2071396" y="746314"/>
-            <a:ext cx="7483151" cy="1446550"/>
+            <a:off x="0" y="447472"/>
+            <a:ext cx="6147881" cy="1384995"/>
           </a:xfrm>
           <a:prstGeom prst="rect">
             <a:avLst/>
@@ -3377,47 +3375,141 @@
           <a:p>
             <a:pPr algn="ctr"/>
             <a:r>
-              <a:rPr lang="en-US" sz="3200" b="1" dirty="0">
+              <a:rPr lang="en-US" sz="2800" b="1" dirty="0">
                 <a:solidFill>
-                  <a:schemeClr val="accent1">
-                    <a:lumMod val="50000"/>
-                  </a:schemeClr>
+                  <a:schemeClr val="bg1"/>
                 </a:solidFill>
+                <a:latin typeface="Algerian" panose="04020705040A02060702" pitchFamily="82" charset="0"/>
+              </a:rPr>
+              <a:t>PwC – Digital Intelligence </a:t>
+            </a:r>
+          </a:p>
+          <a:p>
+            <a:pPr algn="ctr"/>
+            <a:r>
+              <a:rPr lang="en-US" sz="2800" b="1" dirty="0">
+                <a:solidFill>
+                  <a:schemeClr val="bg1"/>
+                </a:solidFill>
+                <a:latin typeface="Algerian" panose="04020705040A02060702" pitchFamily="82" charset="0"/>
+              </a:rPr>
+              <a:t>(Virtual Case Experience)</a:t>
+            </a:r>
+          </a:p>
+          <a:p>
+            <a:pPr algn="ctr"/>
+            <a:r>
+              <a:rPr lang="en-US" sz="2800" b="1" dirty="0">
+                <a:solidFill>
+                  <a:schemeClr val="bg1"/>
+                </a:solidFill>
+                <a:latin typeface="Algerian" panose="04020705040A02060702" pitchFamily="82" charset="0"/>
               </a:rPr>
               <a:t>Task 5 – Predictive Health Care</a:t>
             </a:r>
           </a:p>
-          <a:p>
-            <a:pPr algn="ctr"/>
-            <a:endParaRPr lang="en-US" sz="3200" b="1" dirty="0">
-              <a:solidFill>
-                <a:schemeClr val="accent1">
-                  <a:lumMod val="50000"/>
-                </a:schemeClr>
-              </a:solidFill>
-            </a:endParaRPr>
-          </a:p>
-          <a:p>
-            <a:pPr algn="ctr"/>
-            <a:r>
-              <a:rPr lang="en-US" sz="2400" b="1" dirty="0">
-                <a:solidFill>
-                  <a:schemeClr val="accent1">
-                    <a:lumMod val="50000"/>
-                  </a:schemeClr>
-                </a:solidFill>
-              </a:rPr>
-              <a:t>Comparing Adverse Effects of Medication</a:t>
-            </a:r>
-          </a:p>
-        </p:txBody>
-      </p:sp>
-      <p:sp>
-        <p:nvSpPr>
-          <p:cNvPr id="4" name="TextBox 3">
-            <a:extLst>
-              <a:ext uri="{FF2B5EF4-FFF2-40B4-BE49-F238E27FC236}">
-                <a16:creationId xmlns:a16="http://schemas.microsoft.com/office/drawing/2014/main" id="{45B7BD62-2FB8-9C32-5B0F-5E0D1F970C83}"/>
+        </p:txBody>
+      </p:sp>
+      <p:pic>
+        <p:nvPicPr>
+          <p:cNvPr id="4" name="Picture 3">
+            <a:extLst>
+              <a:ext uri="{FF2B5EF4-FFF2-40B4-BE49-F238E27FC236}">
+                <a16:creationId xmlns:a16="http://schemas.microsoft.com/office/drawing/2014/main" id="{76971B66-9F92-0C61-DD3D-A7FFF26EEF7D}"/>
+              </a:ext>
+            </a:extLst>
+          </p:cNvPr>
+          <p:cNvPicPr>
+            <a:picLocks noChangeAspect="1"/>
+          </p:cNvPicPr>
+          <p:nvPr/>
+        </p:nvPicPr>
+        <p:blipFill>
+          <a:blip r:embed="rId3">
+            <a:extLst>
+              <a:ext uri="{28A0092B-C50C-407E-A947-70E740481C1C}">
+                <a14:useLocalDpi xmlns:a14="http://schemas.microsoft.com/office/drawing/2010/main" val="0"/>
+              </a:ext>
+              <a:ext uri="{837473B0-CC2E-450A-ABE3-18F120FF3D39}">
+                <a1611:picAttrSrcUrl xmlns:a1611="http://schemas.microsoft.com/office/drawing/2016/11/main" r:id="rId4"/>
+              </a:ext>
+            </a:extLst>
+          </a:blip>
+          <a:stretch>
+            <a:fillRect/>
+          </a:stretch>
+        </p:blipFill>
+        <p:spPr>
+          <a:xfrm>
+            <a:off x="6248400" y="0"/>
+            <a:ext cx="5943600" cy="3774332"/>
+          </a:xfrm>
+          <a:prstGeom prst="rect">
+            <a:avLst/>
+          </a:prstGeom>
+          <a:noFill/>
+          <a:ln>
+            <a:noFill/>
+          </a:ln>
+          <a:effectLst/>
+          <a:scene3d>
+            <a:camera prst="orthographicFront"/>
+            <a:lightRig rig="threePt" dir="t"/>
+          </a:scene3d>
+          <a:sp3d extrusionH="76200"/>
+        </p:spPr>
+      </p:pic>
+      <p:pic>
+        <p:nvPicPr>
+          <p:cNvPr id="7" name="Picture 6">
+            <a:extLst>
+              <a:ext uri="{FF2B5EF4-FFF2-40B4-BE49-F238E27FC236}">
+                <a16:creationId xmlns:a16="http://schemas.microsoft.com/office/drawing/2014/main" id="{ED5FB05B-7091-EED3-DB30-CCA218853A37}"/>
+              </a:ext>
+            </a:extLst>
+          </p:cNvPr>
+          <p:cNvPicPr>
+            <a:picLocks noChangeAspect="1"/>
+          </p:cNvPicPr>
+          <p:nvPr/>
+        </p:nvPicPr>
+        <p:blipFill>
+          <a:blip r:embed="rId5">
+            <a:extLst>
+              <a:ext uri="{28A0092B-C50C-407E-A947-70E740481C1C}">
+                <a14:useLocalDpi xmlns:a14="http://schemas.microsoft.com/office/drawing/2010/main" val="0"/>
+              </a:ext>
+              <a:ext uri="{837473B0-CC2E-450A-ABE3-18F120FF3D39}">
+                <a1611:picAttrSrcUrl xmlns:a1611="http://schemas.microsoft.com/office/drawing/2016/11/main" r:id="rId6"/>
+              </a:ext>
+            </a:extLst>
+          </a:blip>
+          <a:stretch>
+            <a:fillRect/>
+          </a:stretch>
+        </p:blipFill>
+        <p:spPr>
+          <a:xfrm>
+            <a:off x="0" y="5971548"/>
+            <a:ext cx="1177047" cy="882785"/>
+          </a:xfrm>
+          <a:prstGeom prst="rect">
+            <a:avLst/>
+          </a:prstGeom>
+          <a:blipFill>
+            <a:blip r:embed="rId7">
+              <a:alphaModFix amt="79000"/>
+            </a:blip>
+            <a:tile tx="0" ty="0" sx="100000" sy="100000" flip="none" algn="tl"/>
+          </a:blipFill>
+        </p:spPr>
+      </p:pic>
+      <p:sp>
+        <p:nvSpPr>
+          <p:cNvPr id="8" name="TextBox 7">
+            <a:extLst>
+              <a:ext uri="{FF2B5EF4-FFF2-40B4-BE49-F238E27FC236}">
+                <a16:creationId xmlns:a16="http://schemas.microsoft.com/office/drawing/2014/main" id="{061EDD61-391B-A343-4B4C-60438A8D6A76}"/>
               </a:ext>
             </a:extLst>
           </p:cNvPr>
@@ -3426,8 +3518,8 @@
         </p:nvSpPr>
         <p:spPr>
           <a:xfrm>
-            <a:off x="8472196" y="5411755"/>
-            <a:ext cx="3275045" cy="584775"/>
+            <a:off x="8407940" y="4951378"/>
+            <a:ext cx="3784060" cy="1384995"/>
           </a:xfrm>
           <a:prstGeom prst="rect">
             <a:avLst/>
@@ -3441,37 +3533,70 @@
           <a:lstStyle/>
           <a:p>
             <a:r>
-              <a:rPr lang="en-US" sz="1600" dirty="0"/>
+              <a:rPr lang="en-US" dirty="0">
+                <a:solidFill>
+                  <a:schemeClr val="bg1"/>
+                </a:solidFill>
+              </a:rPr>
+              <a:t>Data Team:</a:t>
+            </a:r>
+          </a:p>
+          <a:p>
+            <a:endParaRPr lang="en-US" dirty="0">
+              <a:solidFill>
+                <a:schemeClr val="bg1"/>
+              </a:solidFill>
+              <a:latin typeface="Pristina" panose="03060402040406080204" pitchFamily="66" charset="0"/>
+            </a:endParaRPr>
+          </a:p>
+          <a:p>
+            <a:r>
+              <a:rPr lang="en-US" sz="2400" dirty="0">
+                <a:solidFill>
+                  <a:schemeClr val="bg1"/>
+                </a:solidFill>
+                <a:latin typeface="Pristina" panose="03060402040406080204" pitchFamily="66" charset="0"/>
+              </a:rPr>
               <a:t>Akshay Paunikar (Data Scientist)</a:t>
             </a:r>
           </a:p>
           <a:p>
             <a:r>
-              <a:rPr lang="en-US" sz="1600" dirty="0"/>
+              <a:rPr lang="en-US" sz="2400" dirty="0">
+                <a:solidFill>
+                  <a:schemeClr val="bg1"/>
+                </a:solidFill>
+                <a:latin typeface="Pristina" panose="03060402040406080204" pitchFamily="66" charset="0"/>
+              </a:rPr>
               <a:t>Jakob (Senior Data Scientist)</a:t>
             </a:r>
+            <a:endParaRPr lang="en-US" sz="2400" dirty="0">
+              <a:solidFill>
+                <a:schemeClr val="bg1"/>
+              </a:solidFill>
+            </a:endParaRPr>
           </a:p>
         </p:txBody>
       </p:sp>
     </p:spTree>
     <p:extLst>
       <p:ext uri="{BB962C8B-B14F-4D97-AF65-F5344CB8AC3E}">
-        <p14:creationId xmlns:p14="http://schemas.microsoft.com/office/powerpoint/2010/main" val="2755853735"/>
+        <p14:creationId xmlns:p14="http://schemas.microsoft.com/office/powerpoint/2010/main" val="2443591656"/>
       </p:ext>
     </p:extLst>
   </p:cSld>
   <p:clrMapOvr>
     <a:masterClrMapping/>
   </p:clrMapOvr>
-  <mc:AlternateContent xmlns:mc="http://schemas.openxmlformats.org/markup-compatibility/2006" xmlns:p15="http://schemas.microsoft.com/office/powerpoint/2012/main">
-    <mc:Choice Requires="p15">
-      <p:transition xmlns:p14="http://schemas.microsoft.com/office/powerpoint/2010/main" spd="slow" p14:dur="1250">
-        <p15:prstTrans prst="pageCurlDouble"/>
+  <mc:AlternateContent xmlns:mc="http://schemas.openxmlformats.org/markup-compatibility/2006">
+    <mc:Choice xmlns:p14="http://schemas.microsoft.com/office/powerpoint/2010/main" Requires="p14">
+      <p:transition spd="slow" p14:dur="3000">
+        <p:cover dir="r"/>
       </p:transition>
     </mc:Choice>
-    <mc:Fallback xmlns="">
+    <mc:Fallback>
       <p:transition spd="slow">
-        <p:fade/>
+        <p:cover dir="r"/>
       </p:transition>
     </mc:Fallback>
   </mc:AlternateContent>
@@ -3481,6 +3606,16 @@
 <file path=ppt/slides/slide2.xml><?xml version="1.0" encoding="utf-8"?>
 <p:sld xmlns:a="http://schemas.openxmlformats.org/drawingml/2006/main" xmlns:r="http://schemas.openxmlformats.org/officeDocument/2006/relationships" xmlns:p="http://schemas.openxmlformats.org/presentationml/2006/main">
   <p:cSld>
+    <p:bg>
+      <p:bgPr>
+        <a:solidFill>
+          <a:schemeClr val="bg1">
+            <a:lumMod val="50000"/>
+          </a:schemeClr>
+        </a:solidFill>
+        <a:effectLst/>
+      </p:bgPr>
+    </p:bg>
     <p:spTree>
       <p:nvGrpSpPr>
         <p:cNvPr id="1" name=""/>
@@ -3500,7 +3635,7 @@
           <p:cNvPr id="2" name="Title 1">
             <a:extLst>
               <a:ext uri="{FF2B5EF4-FFF2-40B4-BE49-F238E27FC236}">
-                <a16:creationId xmlns:a16="http://schemas.microsoft.com/office/drawing/2014/main" id="{23035FC4-15D0-7346-15B4-74B805538146}"/>
+                <a16:creationId xmlns:a16="http://schemas.microsoft.com/office/drawing/2014/main" id="{95362D86-3445-3D7E-5C09-2880EB7FC2E8}"/>
               </a:ext>
             </a:extLst>
           </p:cNvPr>
@@ -3513,8 +3648,8 @@
         </p:nvSpPr>
         <p:spPr>
           <a:xfrm>
-            <a:off x="2177920" y="327804"/>
-            <a:ext cx="6997959" cy="595928"/>
+            <a:off x="3302895" y="365125"/>
+            <a:ext cx="5586208" cy="586597"/>
           </a:xfrm>
         </p:spPr>
         <p:txBody>
@@ -3525,15 +3660,13 @@
           <a:p>
             <a:pPr algn="ctr"/>
             <a:r>
-              <a:rPr lang="en-US" sz="2800" dirty="0">
+              <a:rPr lang="en-US" sz="2400" b="1" dirty="0">
                 <a:solidFill>
-                  <a:schemeClr val="accent2">
-                    <a:lumMod val="75000"/>
-                  </a:schemeClr>
+                  <a:schemeClr val="bg1"/>
                 </a:solidFill>
-                <a:latin typeface="+mn-lt"/>
+                <a:latin typeface="Algerian" panose="04020705040A02060702" pitchFamily="82" charset="0"/>
               </a:rPr>
-              <a:t>Adverse Effects Comparison</a:t>
+              <a:t>Top 10 Adverse Effect of Drugs</a:t>
             </a:r>
           </a:p>
         </p:txBody>
@@ -3543,7 +3676,7 @@
           <p:cNvPr id="5" name="Content Placeholder 4">
             <a:extLst>
               <a:ext uri="{FF2B5EF4-FFF2-40B4-BE49-F238E27FC236}">
-                <a16:creationId xmlns:a16="http://schemas.microsoft.com/office/drawing/2014/main" id="{FFC58701-524E-13DF-709B-C05BF93B55FB}"/>
+                <a16:creationId xmlns:a16="http://schemas.microsoft.com/office/drawing/2014/main" id="{DA2C08B8-DED7-5A62-ADE4-083B2562B9B7}"/>
               </a:ext>
             </a:extLst>
           </p:cNvPr>
@@ -3562,21 +3695,3661 @@
         </p:blipFill>
         <p:spPr>
           <a:xfrm>
-            <a:off x="-2" y="1826963"/>
-            <a:ext cx="12192001" cy="3528807"/>
+            <a:off x="254539" y="1212941"/>
+            <a:ext cx="11682920" cy="2931041"/>
           </a:xfrm>
+        </p:spPr>
+      </p:pic>
+      <p:pic>
+        <p:nvPicPr>
+          <p:cNvPr id="13" name="Picture 12">
+            <a:extLst>
+              <a:ext uri="{FF2B5EF4-FFF2-40B4-BE49-F238E27FC236}">
+                <a16:creationId xmlns:a16="http://schemas.microsoft.com/office/drawing/2014/main" id="{96CF1640-ADFC-6BEF-F71D-70BDE0731A1A}"/>
+              </a:ext>
+            </a:extLst>
+          </p:cNvPr>
+          <p:cNvPicPr>
+            <a:picLocks noChangeAspect="1"/>
+          </p:cNvPicPr>
+          <p:nvPr/>
+        </p:nvPicPr>
+        <p:blipFill>
+          <a:blip r:embed="rId3">
+            <a:extLst>
+              <a:ext uri="{28A0092B-C50C-407E-A947-70E740481C1C}">
+                <a14:useLocalDpi xmlns:a14="http://schemas.microsoft.com/office/drawing/2010/main" val="0"/>
+              </a:ext>
+              <a:ext uri="{837473B0-CC2E-450A-ABE3-18F120FF3D39}">
+                <a1611:picAttrSrcUrl xmlns:a1611="http://schemas.microsoft.com/office/drawing/2016/11/main" r:id="rId4"/>
+              </a:ext>
+            </a:extLst>
+          </a:blip>
+          <a:stretch>
+            <a:fillRect/>
+          </a:stretch>
+        </p:blipFill>
+        <p:spPr>
+          <a:xfrm>
+            <a:off x="254539" y="4405201"/>
+            <a:ext cx="2118806" cy="2266343"/>
+          </a:xfrm>
+          <a:prstGeom prst="rect">
+            <a:avLst/>
+          </a:prstGeom>
+        </p:spPr>
+      </p:pic>
+      <p:pic>
+        <p:nvPicPr>
+          <p:cNvPr id="15" name="Picture 14">
+            <a:extLst>
+              <a:ext uri="{FF2B5EF4-FFF2-40B4-BE49-F238E27FC236}">
+                <a16:creationId xmlns:a16="http://schemas.microsoft.com/office/drawing/2014/main" id="{7BAC5573-744D-0430-A9A6-8483EA427376}"/>
+              </a:ext>
+            </a:extLst>
+          </p:cNvPr>
+          <p:cNvPicPr>
+            <a:picLocks noChangeAspect="1"/>
+          </p:cNvPicPr>
+          <p:nvPr/>
+        </p:nvPicPr>
+        <p:blipFill>
+          <a:blip r:embed="rId5">
+            <a:extLst>
+              <a:ext uri="{28A0092B-C50C-407E-A947-70E740481C1C}">
+                <a14:useLocalDpi xmlns:a14="http://schemas.microsoft.com/office/drawing/2010/main" val="0"/>
+              </a:ext>
+              <a:ext uri="{837473B0-CC2E-450A-ABE3-18F120FF3D39}">
+                <a1611:picAttrSrcUrl xmlns:a1611="http://schemas.microsoft.com/office/drawing/2016/11/main" r:id="rId6"/>
+              </a:ext>
+            </a:extLst>
+          </a:blip>
+          <a:stretch>
+            <a:fillRect/>
+          </a:stretch>
+        </p:blipFill>
+        <p:spPr>
+          <a:xfrm>
+            <a:off x="9818653" y="4405200"/>
+            <a:ext cx="2118806" cy="2266343"/>
+          </a:xfrm>
+          <a:prstGeom prst="rect">
+            <a:avLst/>
+          </a:prstGeom>
+        </p:spPr>
+      </p:pic>
+      <p:pic>
+        <p:nvPicPr>
+          <p:cNvPr id="17" name="Picture 16">
+            <a:extLst>
+              <a:ext uri="{FF2B5EF4-FFF2-40B4-BE49-F238E27FC236}">
+                <a16:creationId xmlns:a16="http://schemas.microsoft.com/office/drawing/2014/main" id="{FB2132A4-2D39-79AC-9DAD-A96500B1ACDF}"/>
+              </a:ext>
+            </a:extLst>
+          </p:cNvPr>
+          <p:cNvPicPr>
+            <a:picLocks noChangeAspect="1"/>
+          </p:cNvPicPr>
+          <p:nvPr/>
+        </p:nvPicPr>
+        <p:blipFill>
+          <a:blip r:embed="rId7">
+            <a:extLst>
+              <a:ext uri="{28A0092B-C50C-407E-A947-70E740481C1C}">
+                <a14:useLocalDpi xmlns:a14="http://schemas.microsoft.com/office/drawing/2010/main" val="0"/>
+              </a:ext>
+              <a:ext uri="{837473B0-CC2E-450A-ABE3-18F120FF3D39}">
+                <a1611:picAttrSrcUrl xmlns:a1611="http://schemas.microsoft.com/office/drawing/2016/11/main" r:id="rId8"/>
+              </a:ext>
+            </a:extLst>
+          </a:blip>
+          <a:stretch>
+            <a:fillRect/>
+          </a:stretch>
+        </p:blipFill>
+        <p:spPr>
+          <a:xfrm>
+            <a:off x="3688404" y="4405200"/>
+            <a:ext cx="1605063" cy="2266342"/>
+          </a:xfrm>
+          <a:prstGeom prst="rect">
+            <a:avLst/>
+          </a:prstGeom>
+        </p:spPr>
+      </p:pic>
+      <p:pic>
+        <p:nvPicPr>
+          <p:cNvPr id="20" name="Picture 19">
+            <a:extLst>
+              <a:ext uri="{FF2B5EF4-FFF2-40B4-BE49-F238E27FC236}">
+                <a16:creationId xmlns:a16="http://schemas.microsoft.com/office/drawing/2014/main" id="{DDBE6904-DEE8-F647-6721-DA5C5237C611}"/>
+              </a:ext>
+            </a:extLst>
+          </p:cNvPr>
+          <p:cNvPicPr>
+            <a:picLocks noChangeAspect="1"/>
+          </p:cNvPicPr>
+          <p:nvPr/>
+        </p:nvPicPr>
+        <p:blipFill>
+          <a:blip r:embed="rId9">
+            <a:extLst>
+              <a:ext uri="{28A0092B-C50C-407E-A947-70E740481C1C}">
+                <a14:useLocalDpi xmlns:a14="http://schemas.microsoft.com/office/drawing/2010/main" val="0"/>
+              </a:ext>
+              <a:ext uri="{837473B0-CC2E-450A-ABE3-18F120FF3D39}">
+                <a1611:picAttrSrcUrl xmlns:a1611="http://schemas.microsoft.com/office/drawing/2016/11/main" r:id="rId10"/>
+              </a:ext>
+            </a:extLst>
+          </a:blip>
+          <a:stretch>
+            <a:fillRect/>
+          </a:stretch>
+        </p:blipFill>
+        <p:spPr>
+          <a:xfrm>
+            <a:off x="6349019" y="4405199"/>
+            <a:ext cx="2402733" cy="2266343"/>
+          </a:xfrm>
+          <a:prstGeom prst="rect">
+            <a:avLst/>
+          </a:prstGeom>
         </p:spPr>
       </p:pic>
     </p:spTree>
     <p:extLst>
       <p:ext uri="{BB962C8B-B14F-4D97-AF65-F5344CB8AC3E}">
-        <p14:creationId xmlns:p14="http://schemas.microsoft.com/office/powerpoint/2010/main" val="1114372968"/>
+        <p14:creationId xmlns:p14="http://schemas.microsoft.com/office/powerpoint/2010/main" val="1348564176"/>
       </p:ext>
     </p:extLst>
   </p:cSld>
   <p:clrMapOvr>
     <a:masterClrMapping/>
   </p:clrMapOvr>
+  <mc:AlternateContent xmlns:mc="http://schemas.openxmlformats.org/markup-compatibility/2006">
+    <mc:Choice xmlns:p15="http://schemas.microsoft.com/office/powerpoint/2012/main" Requires="p15">
+      <p:transition xmlns:p14="http://schemas.microsoft.com/office/powerpoint/2010/main" spd="slow" p14:dur="2000">
+        <p15:prstTrans prst="fallOver"/>
+      </p:transition>
+    </mc:Choice>
+    <mc:Fallback>
+      <p:transition spd="slow">
+        <p:fade/>
+      </p:transition>
+    </mc:Fallback>
+  </mc:AlternateContent>
+  <p:timing>
+    <p:tnLst>
+      <p:par>
+        <p:cTn id="1" dur="indefinite" restart="never" nodeType="tmRoot">
+          <p:childTnLst>
+            <p:seq concurrent="1" nextAc="seek">
+              <p:cTn id="2" dur="indefinite" nodeType="mainSeq">
+                <p:childTnLst>
+                  <p:par>
+                    <p:cTn id="3" fill="hold">
+                      <p:stCondLst>
+                        <p:cond delay="indefinite"/>
+                      </p:stCondLst>
+                      <p:childTnLst>
+                        <p:par>
+                          <p:cTn id="4" fill="hold">
+                            <p:stCondLst>
+                              <p:cond delay="0"/>
+                            </p:stCondLst>
+                            <p:childTnLst>
+                              <p:par>
+                                <p:cTn id="5" presetID="53" presetClass="entr" presetSubtype="16" fill="hold" nodeType="clickEffect">
+                                  <p:stCondLst>
+                                    <p:cond delay="0"/>
+                                  </p:stCondLst>
+                                  <p:childTnLst>
+                                    <p:set>
+                                      <p:cBhvr>
+                                        <p:cTn id="6" dur="1" fill="hold">
+                                          <p:stCondLst>
+                                            <p:cond delay="0"/>
+                                          </p:stCondLst>
+                                        </p:cTn>
+                                        <p:tgtEl>
+                                          <p:spTgt spid="5"/>
+                                        </p:tgtEl>
+                                        <p:attrNameLst>
+                                          <p:attrName>style.visibility</p:attrName>
+                                        </p:attrNameLst>
+                                      </p:cBhvr>
+                                      <p:to>
+                                        <p:strVal val="visible"/>
+                                      </p:to>
+                                    </p:set>
+                                    <p:anim calcmode="lin" valueType="num">
+                                      <p:cBhvr>
+                                        <p:cTn id="7" dur="1000" fill="hold"/>
+                                        <p:tgtEl>
+                                          <p:spTgt spid="5"/>
+                                        </p:tgtEl>
+                                        <p:attrNameLst>
+                                          <p:attrName>ppt_w</p:attrName>
+                                        </p:attrNameLst>
+                                      </p:cBhvr>
+                                      <p:tavLst>
+                                        <p:tav tm="0">
+                                          <p:val>
+                                            <p:fltVal val="0"/>
+                                          </p:val>
+                                        </p:tav>
+                                        <p:tav tm="100000">
+                                          <p:val>
+                                            <p:strVal val="#ppt_w"/>
+                                          </p:val>
+                                        </p:tav>
+                                      </p:tavLst>
+                                    </p:anim>
+                                    <p:anim calcmode="lin" valueType="num">
+                                      <p:cBhvr>
+                                        <p:cTn id="8" dur="1000" fill="hold"/>
+                                        <p:tgtEl>
+                                          <p:spTgt spid="5"/>
+                                        </p:tgtEl>
+                                        <p:attrNameLst>
+                                          <p:attrName>ppt_h</p:attrName>
+                                        </p:attrNameLst>
+                                      </p:cBhvr>
+                                      <p:tavLst>
+                                        <p:tav tm="0">
+                                          <p:val>
+                                            <p:fltVal val="0"/>
+                                          </p:val>
+                                        </p:tav>
+                                        <p:tav tm="100000">
+                                          <p:val>
+                                            <p:strVal val="#ppt_h"/>
+                                          </p:val>
+                                        </p:tav>
+                                      </p:tavLst>
+                                    </p:anim>
+                                    <p:animEffect transition="in" filter="fade">
+                                      <p:cBhvr>
+                                        <p:cTn id="9" dur="1000"/>
+                                        <p:tgtEl>
+                                          <p:spTgt spid="5"/>
+                                        </p:tgtEl>
+                                      </p:cBhvr>
+                                    </p:animEffect>
+                                  </p:childTnLst>
+                                </p:cTn>
+                              </p:par>
+                            </p:childTnLst>
+                          </p:cTn>
+                        </p:par>
+                      </p:childTnLst>
+                    </p:cTn>
+                  </p:par>
+                  <p:par>
+                    <p:cTn id="10" fill="hold">
+                      <p:stCondLst>
+                        <p:cond delay="indefinite"/>
+                      </p:stCondLst>
+                      <p:childTnLst>
+                        <p:par>
+                          <p:cTn id="11" fill="hold">
+                            <p:stCondLst>
+                              <p:cond delay="0"/>
+                            </p:stCondLst>
+                            <p:childTnLst>
+                              <p:par>
+                                <p:cTn id="12" presetID="31" presetClass="entr" presetSubtype="0" fill="hold" nodeType="clickEffect">
+                                  <p:stCondLst>
+                                    <p:cond delay="0"/>
+                                  </p:stCondLst>
+                                  <p:childTnLst>
+                                    <p:set>
+                                      <p:cBhvr>
+                                        <p:cTn id="13" dur="1" fill="hold">
+                                          <p:stCondLst>
+                                            <p:cond delay="0"/>
+                                          </p:stCondLst>
+                                        </p:cTn>
+                                        <p:tgtEl>
+                                          <p:spTgt spid="13"/>
+                                        </p:tgtEl>
+                                        <p:attrNameLst>
+                                          <p:attrName>style.visibility</p:attrName>
+                                        </p:attrNameLst>
+                                      </p:cBhvr>
+                                      <p:to>
+                                        <p:strVal val="visible"/>
+                                      </p:to>
+                                    </p:set>
+                                    <p:anim calcmode="lin" valueType="num">
+                                      <p:cBhvr>
+                                        <p:cTn id="14" dur="1000" fill="hold"/>
+                                        <p:tgtEl>
+                                          <p:spTgt spid="13"/>
+                                        </p:tgtEl>
+                                        <p:attrNameLst>
+                                          <p:attrName>ppt_w</p:attrName>
+                                        </p:attrNameLst>
+                                      </p:cBhvr>
+                                      <p:tavLst>
+                                        <p:tav tm="0">
+                                          <p:val>
+                                            <p:fltVal val="0"/>
+                                          </p:val>
+                                        </p:tav>
+                                        <p:tav tm="100000">
+                                          <p:val>
+                                            <p:strVal val="#ppt_w"/>
+                                          </p:val>
+                                        </p:tav>
+                                      </p:tavLst>
+                                    </p:anim>
+                                    <p:anim calcmode="lin" valueType="num">
+                                      <p:cBhvr>
+                                        <p:cTn id="15" dur="1000" fill="hold"/>
+                                        <p:tgtEl>
+                                          <p:spTgt spid="13"/>
+                                        </p:tgtEl>
+                                        <p:attrNameLst>
+                                          <p:attrName>ppt_h</p:attrName>
+                                        </p:attrNameLst>
+                                      </p:cBhvr>
+                                      <p:tavLst>
+                                        <p:tav tm="0">
+                                          <p:val>
+                                            <p:fltVal val="0"/>
+                                          </p:val>
+                                        </p:tav>
+                                        <p:tav tm="100000">
+                                          <p:val>
+                                            <p:strVal val="#ppt_h"/>
+                                          </p:val>
+                                        </p:tav>
+                                      </p:tavLst>
+                                    </p:anim>
+                                    <p:anim calcmode="lin" valueType="num">
+                                      <p:cBhvr>
+                                        <p:cTn id="16" dur="1000" fill="hold"/>
+                                        <p:tgtEl>
+                                          <p:spTgt spid="13"/>
+                                        </p:tgtEl>
+                                        <p:attrNameLst>
+                                          <p:attrName>style.rotation</p:attrName>
+                                        </p:attrNameLst>
+                                      </p:cBhvr>
+                                      <p:tavLst>
+                                        <p:tav tm="0">
+                                          <p:val>
+                                            <p:fltVal val="90"/>
+                                          </p:val>
+                                        </p:tav>
+                                        <p:tav tm="100000">
+                                          <p:val>
+                                            <p:fltVal val="0"/>
+                                          </p:val>
+                                        </p:tav>
+                                      </p:tavLst>
+                                    </p:anim>
+                                    <p:animEffect transition="in" filter="fade">
+                                      <p:cBhvr>
+                                        <p:cTn id="17" dur="1000"/>
+                                        <p:tgtEl>
+                                          <p:spTgt spid="13"/>
+                                        </p:tgtEl>
+                                      </p:cBhvr>
+                                    </p:animEffect>
+                                  </p:childTnLst>
+                                </p:cTn>
+                              </p:par>
+                            </p:childTnLst>
+                          </p:cTn>
+                        </p:par>
+                      </p:childTnLst>
+                    </p:cTn>
+                  </p:par>
+                  <p:par>
+                    <p:cTn id="18" fill="hold">
+                      <p:stCondLst>
+                        <p:cond delay="indefinite"/>
+                      </p:stCondLst>
+                      <p:childTnLst>
+                        <p:par>
+                          <p:cTn id="19" fill="hold">
+                            <p:stCondLst>
+                              <p:cond delay="0"/>
+                            </p:stCondLst>
+                            <p:childTnLst>
+                              <p:par>
+                                <p:cTn id="20" presetID="31" presetClass="entr" presetSubtype="0" fill="hold" nodeType="clickEffect">
+                                  <p:stCondLst>
+                                    <p:cond delay="0"/>
+                                  </p:stCondLst>
+                                  <p:childTnLst>
+                                    <p:set>
+                                      <p:cBhvr>
+                                        <p:cTn id="21" dur="1" fill="hold">
+                                          <p:stCondLst>
+                                            <p:cond delay="0"/>
+                                          </p:stCondLst>
+                                        </p:cTn>
+                                        <p:tgtEl>
+                                          <p:spTgt spid="17"/>
+                                        </p:tgtEl>
+                                        <p:attrNameLst>
+                                          <p:attrName>style.visibility</p:attrName>
+                                        </p:attrNameLst>
+                                      </p:cBhvr>
+                                      <p:to>
+                                        <p:strVal val="visible"/>
+                                      </p:to>
+                                    </p:set>
+                                    <p:anim calcmode="lin" valueType="num">
+                                      <p:cBhvr>
+                                        <p:cTn id="22" dur="1000" fill="hold"/>
+                                        <p:tgtEl>
+                                          <p:spTgt spid="17"/>
+                                        </p:tgtEl>
+                                        <p:attrNameLst>
+                                          <p:attrName>ppt_w</p:attrName>
+                                        </p:attrNameLst>
+                                      </p:cBhvr>
+                                      <p:tavLst>
+                                        <p:tav tm="0">
+                                          <p:val>
+                                            <p:fltVal val="0"/>
+                                          </p:val>
+                                        </p:tav>
+                                        <p:tav tm="100000">
+                                          <p:val>
+                                            <p:strVal val="#ppt_w"/>
+                                          </p:val>
+                                        </p:tav>
+                                      </p:tavLst>
+                                    </p:anim>
+                                    <p:anim calcmode="lin" valueType="num">
+                                      <p:cBhvr>
+                                        <p:cTn id="23" dur="1000" fill="hold"/>
+                                        <p:tgtEl>
+                                          <p:spTgt spid="17"/>
+                                        </p:tgtEl>
+                                        <p:attrNameLst>
+                                          <p:attrName>ppt_h</p:attrName>
+                                        </p:attrNameLst>
+                                      </p:cBhvr>
+                                      <p:tavLst>
+                                        <p:tav tm="0">
+                                          <p:val>
+                                            <p:fltVal val="0"/>
+                                          </p:val>
+                                        </p:tav>
+                                        <p:tav tm="100000">
+                                          <p:val>
+                                            <p:strVal val="#ppt_h"/>
+                                          </p:val>
+                                        </p:tav>
+                                      </p:tavLst>
+                                    </p:anim>
+                                    <p:anim calcmode="lin" valueType="num">
+                                      <p:cBhvr>
+                                        <p:cTn id="24" dur="1000" fill="hold"/>
+                                        <p:tgtEl>
+                                          <p:spTgt spid="17"/>
+                                        </p:tgtEl>
+                                        <p:attrNameLst>
+                                          <p:attrName>style.rotation</p:attrName>
+                                        </p:attrNameLst>
+                                      </p:cBhvr>
+                                      <p:tavLst>
+                                        <p:tav tm="0">
+                                          <p:val>
+                                            <p:fltVal val="90"/>
+                                          </p:val>
+                                        </p:tav>
+                                        <p:tav tm="100000">
+                                          <p:val>
+                                            <p:fltVal val="0"/>
+                                          </p:val>
+                                        </p:tav>
+                                      </p:tavLst>
+                                    </p:anim>
+                                    <p:animEffect transition="in" filter="fade">
+                                      <p:cBhvr>
+                                        <p:cTn id="25" dur="1000"/>
+                                        <p:tgtEl>
+                                          <p:spTgt spid="17"/>
+                                        </p:tgtEl>
+                                      </p:cBhvr>
+                                    </p:animEffect>
+                                  </p:childTnLst>
+                                </p:cTn>
+                              </p:par>
+                            </p:childTnLst>
+                          </p:cTn>
+                        </p:par>
+                      </p:childTnLst>
+                    </p:cTn>
+                  </p:par>
+                  <p:par>
+                    <p:cTn id="26" fill="hold">
+                      <p:stCondLst>
+                        <p:cond delay="indefinite"/>
+                      </p:stCondLst>
+                      <p:childTnLst>
+                        <p:par>
+                          <p:cTn id="27" fill="hold">
+                            <p:stCondLst>
+                              <p:cond delay="0"/>
+                            </p:stCondLst>
+                            <p:childTnLst>
+                              <p:par>
+                                <p:cTn id="28" presetID="31" presetClass="entr" presetSubtype="0" fill="hold" nodeType="clickEffect">
+                                  <p:stCondLst>
+                                    <p:cond delay="0"/>
+                                  </p:stCondLst>
+                                  <p:childTnLst>
+                                    <p:set>
+                                      <p:cBhvr>
+                                        <p:cTn id="29" dur="1" fill="hold">
+                                          <p:stCondLst>
+                                            <p:cond delay="0"/>
+                                          </p:stCondLst>
+                                        </p:cTn>
+                                        <p:tgtEl>
+                                          <p:spTgt spid="20"/>
+                                        </p:tgtEl>
+                                        <p:attrNameLst>
+                                          <p:attrName>style.visibility</p:attrName>
+                                        </p:attrNameLst>
+                                      </p:cBhvr>
+                                      <p:to>
+                                        <p:strVal val="visible"/>
+                                      </p:to>
+                                    </p:set>
+                                    <p:anim calcmode="lin" valueType="num">
+                                      <p:cBhvr>
+                                        <p:cTn id="30" dur="1000" fill="hold"/>
+                                        <p:tgtEl>
+                                          <p:spTgt spid="20"/>
+                                        </p:tgtEl>
+                                        <p:attrNameLst>
+                                          <p:attrName>ppt_w</p:attrName>
+                                        </p:attrNameLst>
+                                      </p:cBhvr>
+                                      <p:tavLst>
+                                        <p:tav tm="0">
+                                          <p:val>
+                                            <p:fltVal val="0"/>
+                                          </p:val>
+                                        </p:tav>
+                                        <p:tav tm="100000">
+                                          <p:val>
+                                            <p:strVal val="#ppt_w"/>
+                                          </p:val>
+                                        </p:tav>
+                                      </p:tavLst>
+                                    </p:anim>
+                                    <p:anim calcmode="lin" valueType="num">
+                                      <p:cBhvr>
+                                        <p:cTn id="31" dur="1000" fill="hold"/>
+                                        <p:tgtEl>
+                                          <p:spTgt spid="20"/>
+                                        </p:tgtEl>
+                                        <p:attrNameLst>
+                                          <p:attrName>ppt_h</p:attrName>
+                                        </p:attrNameLst>
+                                      </p:cBhvr>
+                                      <p:tavLst>
+                                        <p:tav tm="0">
+                                          <p:val>
+                                            <p:fltVal val="0"/>
+                                          </p:val>
+                                        </p:tav>
+                                        <p:tav tm="100000">
+                                          <p:val>
+                                            <p:strVal val="#ppt_h"/>
+                                          </p:val>
+                                        </p:tav>
+                                      </p:tavLst>
+                                    </p:anim>
+                                    <p:anim calcmode="lin" valueType="num">
+                                      <p:cBhvr>
+                                        <p:cTn id="32" dur="1000" fill="hold"/>
+                                        <p:tgtEl>
+                                          <p:spTgt spid="20"/>
+                                        </p:tgtEl>
+                                        <p:attrNameLst>
+                                          <p:attrName>style.rotation</p:attrName>
+                                        </p:attrNameLst>
+                                      </p:cBhvr>
+                                      <p:tavLst>
+                                        <p:tav tm="0">
+                                          <p:val>
+                                            <p:fltVal val="90"/>
+                                          </p:val>
+                                        </p:tav>
+                                        <p:tav tm="100000">
+                                          <p:val>
+                                            <p:fltVal val="0"/>
+                                          </p:val>
+                                        </p:tav>
+                                      </p:tavLst>
+                                    </p:anim>
+                                    <p:animEffect transition="in" filter="fade">
+                                      <p:cBhvr>
+                                        <p:cTn id="33" dur="1000"/>
+                                        <p:tgtEl>
+                                          <p:spTgt spid="20"/>
+                                        </p:tgtEl>
+                                      </p:cBhvr>
+                                    </p:animEffect>
+                                  </p:childTnLst>
+                                </p:cTn>
+                              </p:par>
+                            </p:childTnLst>
+                          </p:cTn>
+                        </p:par>
+                      </p:childTnLst>
+                    </p:cTn>
+                  </p:par>
+                  <p:par>
+                    <p:cTn id="34" fill="hold">
+                      <p:stCondLst>
+                        <p:cond delay="indefinite"/>
+                      </p:stCondLst>
+                      <p:childTnLst>
+                        <p:par>
+                          <p:cTn id="35" fill="hold">
+                            <p:stCondLst>
+                              <p:cond delay="0"/>
+                            </p:stCondLst>
+                            <p:childTnLst>
+                              <p:par>
+                                <p:cTn id="36" presetID="31" presetClass="entr" presetSubtype="0" fill="hold" nodeType="clickEffect">
+                                  <p:stCondLst>
+                                    <p:cond delay="0"/>
+                                  </p:stCondLst>
+                                  <p:childTnLst>
+                                    <p:set>
+                                      <p:cBhvr>
+                                        <p:cTn id="37" dur="1" fill="hold">
+                                          <p:stCondLst>
+                                            <p:cond delay="0"/>
+                                          </p:stCondLst>
+                                        </p:cTn>
+                                        <p:tgtEl>
+                                          <p:spTgt spid="15"/>
+                                        </p:tgtEl>
+                                        <p:attrNameLst>
+                                          <p:attrName>style.visibility</p:attrName>
+                                        </p:attrNameLst>
+                                      </p:cBhvr>
+                                      <p:to>
+                                        <p:strVal val="visible"/>
+                                      </p:to>
+                                    </p:set>
+                                    <p:anim calcmode="lin" valueType="num">
+                                      <p:cBhvr>
+                                        <p:cTn id="38" dur="1000" fill="hold"/>
+                                        <p:tgtEl>
+                                          <p:spTgt spid="15"/>
+                                        </p:tgtEl>
+                                        <p:attrNameLst>
+                                          <p:attrName>ppt_w</p:attrName>
+                                        </p:attrNameLst>
+                                      </p:cBhvr>
+                                      <p:tavLst>
+                                        <p:tav tm="0">
+                                          <p:val>
+                                            <p:fltVal val="0"/>
+                                          </p:val>
+                                        </p:tav>
+                                        <p:tav tm="100000">
+                                          <p:val>
+                                            <p:strVal val="#ppt_w"/>
+                                          </p:val>
+                                        </p:tav>
+                                      </p:tavLst>
+                                    </p:anim>
+                                    <p:anim calcmode="lin" valueType="num">
+                                      <p:cBhvr>
+                                        <p:cTn id="39" dur="1000" fill="hold"/>
+                                        <p:tgtEl>
+                                          <p:spTgt spid="15"/>
+                                        </p:tgtEl>
+                                        <p:attrNameLst>
+                                          <p:attrName>ppt_h</p:attrName>
+                                        </p:attrNameLst>
+                                      </p:cBhvr>
+                                      <p:tavLst>
+                                        <p:tav tm="0">
+                                          <p:val>
+                                            <p:fltVal val="0"/>
+                                          </p:val>
+                                        </p:tav>
+                                        <p:tav tm="100000">
+                                          <p:val>
+                                            <p:strVal val="#ppt_h"/>
+                                          </p:val>
+                                        </p:tav>
+                                      </p:tavLst>
+                                    </p:anim>
+                                    <p:anim calcmode="lin" valueType="num">
+                                      <p:cBhvr>
+                                        <p:cTn id="40" dur="1000" fill="hold"/>
+                                        <p:tgtEl>
+                                          <p:spTgt spid="15"/>
+                                        </p:tgtEl>
+                                        <p:attrNameLst>
+                                          <p:attrName>style.rotation</p:attrName>
+                                        </p:attrNameLst>
+                                      </p:cBhvr>
+                                      <p:tavLst>
+                                        <p:tav tm="0">
+                                          <p:val>
+                                            <p:fltVal val="90"/>
+                                          </p:val>
+                                        </p:tav>
+                                        <p:tav tm="100000">
+                                          <p:val>
+                                            <p:fltVal val="0"/>
+                                          </p:val>
+                                        </p:tav>
+                                      </p:tavLst>
+                                    </p:anim>
+                                    <p:animEffect transition="in" filter="fade">
+                                      <p:cBhvr>
+                                        <p:cTn id="41" dur="1000"/>
+                                        <p:tgtEl>
+                                          <p:spTgt spid="15"/>
+                                        </p:tgtEl>
+                                      </p:cBhvr>
+                                    </p:animEffect>
+                                  </p:childTnLst>
+                                </p:cTn>
+                              </p:par>
+                            </p:childTnLst>
+                          </p:cTn>
+                        </p:par>
+                      </p:childTnLst>
+                    </p:cTn>
+                  </p:par>
+                </p:childTnLst>
+              </p:cTn>
+              <p:prevCondLst>
+                <p:cond evt="onPrev" delay="0">
+                  <p:tgtEl>
+                    <p:sldTgt/>
+                  </p:tgtEl>
+                </p:cond>
+              </p:prevCondLst>
+              <p:nextCondLst>
+                <p:cond evt="onNext" delay="0">
+                  <p:tgtEl>
+                    <p:sldTgt/>
+                  </p:tgtEl>
+                </p:cond>
+              </p:nextCondLst>
+            </p:seq>
+          </p:childTnLst>
+        </p:cTn>
+      </p:par>
+    </p:tnLst>
+  </p:timing>
+</p:sld>
+</file>
+
+<file path=ppt/slides/slide3.xml><?xml version="1.0" encoding="utf-8"?>
+<p:sld xmlns:a="http://schemas.openxmlformats.org/drawingml/2006/main" xmlns:r="http://schemas.openxmlformats.org/officeDocument/2006/relationships" xmlns:p="http://schemas.openxmlformats.org/presentationml/2006/main">
+  <p:cSld>
+    <p:bg>
+      <p:bgPr>
+        <a:solidFill>
+          <a:schemeClr val="bg1">
+            <a:lumMod val="50000"/>
+          </a:schemeClr>
+        </a:solidFill>
+        <a:effectLst/>
+      </p:bgPr>
+    </p:bg>
+    <p:spTree>
+      <p:nvGrpSpPr>
+        <p:cNvPr id="1" name=""/>
+        <p:cNvGrpSpPr/>
+        <p:nvPr/>
+      </p:nvGrpSpPr>
+      <p:grpSpPr>
+        <a:xfrm>
+          <a:off x="0" y="0"/>
+          <a:ext cx="0" cy="0"/>
+          <a:chOff x="0" y="0"/>
+          <a:chExt cx="0" cy="0"/>
+        </a:xfrm>
+      </p:grpSpPr>
+      <p:sp>
+        <p:nvSpPr>
+          <p:cNvPr id="3" name="TextBox 2">
+            <a:extLst>
+              <a:ext uri="{FF2B5EF4-FFF2-40B4-BE49-F238E27FC236}">
+                <a16:creationId xmlns:a16="http://schemas.microsoft.com/office/drawing/2014/main" id="{A10503DC-96C7-3F4C-6B73-1B9C8AFFF468}"/>
+              </a:ext>
+            </a:extLst>
+          </p:cNvPr>
+          <p:cNvSpPr txBox="1"/>
+          <p:nvPr/>
+        </p:nvSpPr>
+        <p:spPr>
+          <a:xfrm>
+            <a:off x="4262336" y="243192"/>
+            <a:ext cx="3667328" cy="461665"/>
+          </a:xfrm>
+          <a:prstGeom prst="rect">
+            <a:avLst/>
+          </a:prstGeom>
+          <a:noFill/>
+        </p:spPr>
+        <p:txBody>
+          <a:bodyPr wrap="square" rtlCol="0" anchor="ctr">
+            <a:spAutoFit/>
+          </a:bodyPr>
+          <a:lstStyle/>
+          <a:p>
+            <a:pPr algn="ctr"/>
+            <a:r>
+              <a:rPr lang="en-US" sz="2400" dirty="0">
+                <a:solidFill>
+                  <a:schemeClr val="bg1"/>
+                </a:solidFill>
+                <a:latin typeface="Algerian" panose="04020705040A02060702" pitchFamily="82" charset="0"/>
+              </a:rPr>
+              <a:t>Comparison of drugs</a:t>
+            </a:r>
+          </a:p>
+        </p:txBody>
+      </p:sp>
+      <p:sp>
+        <p:nvSpPr>
+          <p:cNvPr id="4" name="TextBox 3">
+            <a:extLst>
+              <a:ext uri="{FF2B5EF4-FFF2-40B4-BE49-F238E27FC236}">
+                <a16:creationId xmlns:a16="http://schemas.microsoft.com/office/drawing/2014/main" id="{99955E3E-28F1-8804-3046-C1A3C3A0DCEF}"/>
+              </a:ext>
+            </a:extLst>
+          </p:cNvPr>
+          <p:cNvSpPr txBox="1"/>
+          <p:nvPr/>
+        </p:nvSpPr>
+        <p:spPr>
+          <a:xfrm>
+            <a:off x="243200" y="1155278"/>
+            <a:ext cx="2743200" cy="1828800"/>
+          </a:xfrm>
+          <a:prstGeom prst="rect">
+            <a:avLst/>
+          </a:prstGeom>
+          <a:solidFill>
+            <a:schemeClr val="accent5">
+              <a:lumMod val="50000"/>
+            </a:schemeClr>
+          </a:solidFill>
+        </p:spPr>
+        <p:txBody>
+          <a:bodyPr wrap="square" rtlCol="0" anchor="ctr">
+            <a:spAutoFit/>
+          </a:bodyPr>
+          <a:lstStyle/>
+          <a:p>
+            <a:pPr algn="ctr"/>
+            <a:r>
+              <a:rPr lang="en-US" dirty="0">
+                <a:solidFill>
+                  <a:schemeClr val="bg1"/>
+                </a:solidFill>
+              </a:rPr>
+              <a:t>Top Adverse Effects of TRAMAL</a:t>
+            </a:r>
+          </a:p>
+          <a:p>
+            <a:endParaRPr lang="en-US" dirty="0">
+              <a:solidFill>
+                <a:schemeClr val="bg1"/>
+              </a:solidFill>
+            </a:endParaRPr>
+          </a:p>
+          <a:p>
+            <a:pPr marL="285750" indent="-285750">
+              <a:buFont typeface="Arial" panose="020B0604020202020204" pitchFamily="34" charset="0"/>
+              <a:buChar char="•"/>
+            </a:pPr>
+            <a:r>
+              <a:rPr lang="en-US" dirty="0">
+                <a:solidFill>
+                  <a:schemeClr val="bg1"/>
+                </a:solidFill>
+              </a:rPr>
+              <a:t>Nausea</a:t>
+            </a:r>
+          </a:p>
+          <a:p>
+            <a:pPr marL="285750" indent="-285750">
+              <a:buFont typeface="Arial" panose="020B0604020202020204" pitchFamily="34" charset="0"/>
+              <a:buChar char="•"/>
+            </a:pPr>
+            <a:r>
+              <a:rPr lang="en-US" dirty="0">
+                <a:solidFill>
+                  <a:schemeClr val="bg1"/>
+                </a:solidFill>
+              </a:rPr>
+              <a:t>Pyrexia</a:t>
+            </a:r>
+          </a:p>
+          <a:p>
+            <a:pPr marL="285750" indent="-285750">
+              <a:buFont typeface="Arial" panose="020B0604020202020204" pitchFamily="34" charset="0"/>
+              <a:buChar char="•"/>
+            </a:pPr>
+            <a:r>
+              <a:rPr lang="en-US" dirty="0">
+                <a:solidFill>
+                  <a:schemeClr val="bg1"/>
+                </a:solidFill>
+              </a:rPr>
+              <a:t>Abdominal Pain</a:t>
+            </a:r>
+          </a:p>
+        </p:txBody>
+      </p:sp>
+      <p:sp>
+        <p:nvSpPr>
+          <p:cNvPr id="7" name="TextBox 6">
+            <a:extLst>
+              <a:ext uri="{FF2B5EF4-FFF2-40B4-BE49-F238E27FC236}">
+                <a16:creationId xmlns:a16="http://schemas.microsoft.com/office/drawing/2014/main" id="{CB187A45-CB86-8BA5-69B8-35FB67F4E0D3}"/>
+              </a:ext>
+            </a:extLst>
+          </p:cNvPr>
+          <p:cNvSpPr txBox="1"/>
+          <p:nvPr/>
+        </p:nvSpPr>
+        <p:spPr>
+          <a:xfrm>
+            <a:off x="4554166" y="1155278"/>
+            <a:ext cx="2743200" cy="1828800"/>
+          </a:xfrm>
+          <a:prstGeom prst="rect">
+            <a:avLst/>
+          </a:prstGeom>
+          <a:solidFill>
+            <a:schemeClr val="accent2">
+              <a:lumMod val="75000"/>
+            </a:schemeClr>
+          </a:solidFill>
+        </p:spPr>
+        <p:txBody>
+          <a:bodyPr wrap="square" rtlCol="0" anchor="ctr">
+            <a:spAutoFit/>
+          </a:bodyPr>
+          <a:lstStyle/>
+          <a:p>
+            <a:pPr algn="ctr"/>
+            <a:r>
+              <a:rPr lang="en-US" dirty="0">
+                <a:solidFill>
+                  <a:schemeClr val="bg1"/>
+                </a:solidFill>
+              </a:rPr>
+              <a:t>Top Adverse Effects of LYRICA</a:t>
+            </a:r>
+          </a:p>
+          <a:p>
+            <a:pPr algn="ctr"/>
+            <a:endParaRPr lang="en-US" dirty="0">
+              <a:solidFill>
+                <a:schemeClr val="bg1"/>
+              </a:solidFill>
+            </a:endParaRPr>
+          </a:p>
+          <a:p>
+            <a:pPr marL="285750" indent="-285750">
+              <a:buFont typeface="Arial" panose="020B0604020202020204" pitchFamily="34" charset="0"/>
+              <a:buChar char="•"/>
+            </a:pPr>
+            <a:r>
+              <a:rPr lang="en-US" dirty="0">
+                <a:solidFill>
+                  <a:schemeClr val="bg1"/>
+                </a:solidFill>
+              </a:rPr>
+              <a:t>Pain</a:t>
+            </a:r>
+          </a:p>
+          <a:p>
+            <a:pPr marL="285750" indent="-285750">
+              <a:buFont typeface="Arial" panose="020B0604020202020204" pitchFamily="34" charset="0"/>
+              <a:buChar char="•"/>
+            </a:pPr>
+            <a:r>
+              <a:rPr lang="en-US" dirty="0">
+                <a:solidFill>
+                  <a:schemeClr val="bg1"/>
+                </a:solidFill>
+              </a:rPr>
+              <a:t>Drug Ineffective</a:t>
+            </a:r>
+          </a:p>
+          <a:p>
+            <a:pPr marL="285750" indent="-285750">
+              <a:buFont typeface="Arial" panose="020B0604020202020204" pitchFamily="34" charset="0"/>
+              <a:buChar char="•"/>
+            </a:pPr>
+            <a:r>
+              <a:rPr lang="en-US" dirty="0">
+                <a:solidFill>
+                  <a:schemeClr val="bg1"/>
+                </a:solidFill>
+              </a:rPr>
+              <a:t>Malaise</a:t>
+            </a:r>
+          </a:p>
+        </p:txBody>
+      </p:sp>
+      <p:sp>
+        <p:nvSpPr>
+          <p:cNvPr id="8" name="TextBox 7">
+            <a:extLst>
+              <a:ext uri="{FF2B5EF4-FFF2-40B4-BE49-F238E27FC236}">
+                <a16:creationId xmlns:a16="http://schemas.microsoft.com/office/drawing/2014/main" id="{A7C5426A-0735-9B61-E0C5-8D6239735C40}"/>
+              </a:ext>
+            </a:extLst>
+          </p:cNvPr>
+          <p:cNvSpPr txBox="1"/>
+          <p:nvPr/>
+        </p:nvSpPr>
+        <p:spPr>
+          <a:xfrm>
+            <a:off x="9205600" y="1155278"/>
+            <a:ext cx="2743200" cy="1828800"/>
+          </a:xfrm>
+          <a:prstGeom prst="rect">
+            <a:avLst/>
+          </a:prstGeom>
+          <a:solidFill>
+            <a:srgbClr val="FF0000"/>
+          </a:solidFill>
+        </p:spPr>
+        <p:txBody>
+          <a:bodyPr wrap="square" rtlCol="0" anchor="ctr">
+            <a:spAutoFit/>
+          </a:bodyPr>
+          <a:lstStyle/>
+          <a:p>
+            <a:pPr algn="ctr"/>
+            <a:r>
+              <a:rPr lang="en-US" dirty="0">
+                <a:solidFill>
+                  <a:schemeClr val="bg1"/>
+                </a:solidFill>
+              </a:rPr>
+              <a:t>Top Adverse Effects of GABAPENTIN</a:t>
+            </a:r>
+          </a:p>
+          <a:p>
+            <a:pPr algn="ctr"/>
+            <a:endParaRPr lang="en-US" dirty="0">
+              <a:solidFill>
+                <a:schemeClr val="bg1"/>
+              </a:solidFill>
+            </a:endParaRPr>
+          </a:p>
+          <a:p>
+            <a:pPr marL="285750" indent="-285750">
+              <a:buFont typeface="Arial" panose="020B0604020202020204" pitchFamily="34" charset="0"/>
+              <a:buChar char="•"/>
+            </a:pPr>
+            <a:r>
+              <a:rPr lang="en-US" dirty="0">
+                <a:solidFill>
+                  <a:schemeClr val="bg1"/>
+                </a:solidFill>
+              </a:rPr>
+              <a:t>Chronic Kidney Disease</a:t>
+            </a:r>
+          </a:p>
+          <a:p>
+            <a:pPr marL="285750" indent="-285750">
+              <a:buFont typeface="Arial" panose="020B0604020202020204" pitchFamily="34" charset="0"/>
+              <a:buChar char="•"/>
+            </a:pPr>
+            <a:r>
+              <a:rPr lang="en-US" dirty="0">
+                <a:solidFill>
+                  <a:schemeClr val="bg1"/>
+                </a:solidFill>
+              </a:rPr>
+              <a:t>Drug Ineffective</a:t>
+            </a:r>
+          </a:p>
+          <a:p>
+            <a:pPr marL="285750" indent="-285750">
+              <a:buFont typeface="Arial" panose="020B0604020202020204" pitchFamily="34" charset="0"/>
+              <a:buChar char="•"/>
+            </a:pPr>
+            <a:r>
+              <a:rPr lang="en-US" dirty="0">
+                <a:solidFill>
+                  <a:schemeClr val="bg1"/>
+                </a:solidFill>
+              </a:rPr>
+              <a:t>Acute Kidney injury</a:t>
+            </a:r>
+          </a:p>
+        </p:txBody>
+      </p:sp>
+      <p:sp>
+        <p:nvSpPr>
+          <p:cNvPr id="9" name="TextBox 8">
+            <a:extLst>
+              <a:ext uri="{FF2B5EF4-FFF2-40B4-BE49-F238E27FC236}">
+                <a16:creationId xmlns:a16="http://schemas.microsoft.com/office/drawing/2014/main" id="{B8E9124F-41E4-37EB-457A-0A71DAAB0FFD}"/>
+              </a:ext>
+            </a:extLst>
+          </p:cNvPr>
+          <p:cNvSpPr txBox="1"/>
+          <p:nvPr/>
+        </p:nvSpPr>
+        <p:spPr>
+          <a:xfrm>
+            <a:off x="437745" y="3608962"/>
+            <a:ext cx="11215991" cy="2800767"/>
+          </a:xfrm>
+          <a:prstGeom prst="rect">
+            <a:avLst/>
+          </a:prstGeom>
+          <a:noFill/>
+        </p:spPr>
+        <p:txBody>
+          <a:bodyPr wrap="square" rtlCol="0">
+            <a:spAutoFit/>
+          </a:bodyPr>
+          <a:lstStyle/>
+          <a:p>
+            <a:pPr algn="just"/>
+            <a:r>
+              <a:rPr lang="en-US" sz="1600" dirty="0">
+                <a:solidFill>
+                  <a:schemeClr val="bg1"/>
+                </a:solidFill>
+              </a:rPr>
+              <a:t>The top two adverse effects of Lyrica seem to indicate, that a patient visits the doctor again because of sense pain and/or because of the feeling that the drug might not work as intended. This could be an indication that Lyrica might not be a proper drug against pain in many occasions. </a:t>
+            </a:r>
+          </a:p>
+          <a:p>
+            <a:pPr algn="just"/>
+            <a:endParaRPr lang="en-US" sz="1600" dirty="0">
+              <a:solidFill>
+                <a:schemeClr val="bg1"/>
+              </a:solidFill>
+            </a:endParaRPr>
+          </a:p>
+          <a:p>
+            <a:pPr algn="just"/>
+            <a:r>
+              <a:rPr lang="en-US" sz="1600" dirty="0">
+                <a:solidFill>
+                  <a:schemeClr val="bg1"/>
+                </a:solidFill>
+              </a:rPr>
+              <a:t>The top adverse effects of Gabapentin are Chronic Kidney Disease, Drug Ineffective, Acute Kidney Injury which seems very serious as compared to the other two drugs. Hence, this indicates that Gabapentin is not a proper drug against the pain in many occasions.</a:t>
+            </a:r>
+          </a:p>
+          <a:p>
+            <a:pPr algn="just"/>
+            <a:endParaRPr lang="en-US" sz="1600" dirty="0">
+              <a:solidFill>
+                <a:schemeClr val="bg1"/>
+              </a:solidFill>
+            </a:endParaRPr>
+          </a:p>
+          <a:p>
+            <a:pPr algn="just"/>
+            <a:r>
+              <a:rPr lang="en-US" sz="1600" dirty="0">
+                <a:solidFill>
+                  <a:schemeClr val="bg1"/>
+                </a:solidFill>
+              </a:rPr>
+              <a:t>On the other side, adverse effects of Tramal seem to show, that many patients get nausea. Considering the fact, that Tramal is usually </a:t>
+            </a:r>
+            <a:br>
+              <a:rPr lang="en-US" sz="1600" dirty="0">
+                <a:solidFill>
+                  <a:schemeClr val="bg1"/>
+                </a:solidFill>
+              </a:rPr>
+            </a:br>
+            <a:r>
+              <a:rPr lang="en-US" sz="1600" dirty="0">
+                <a:solidFill>
+                  <a:schemeClr val="bg1"/>
+                </a:solidFill>
+              </a:rPr>
+              <a:t>prescribed for severe pain and that “pain” is not listed in the adverse effects, the conclusion can be made, that Tramal is actually working as intended. However, it also seems that there are more severe adverse effects that might prevent patients to take the drug long term.</a:t>
+            </a:r>
+          </a:p>
+        </p:txBody>
+      </p:sp>
+    </p:spTree>
+    <p:extLst>
+      <p:ext uri="{BB962C8B-B14F-4D97-AF65-F5344CB8AC3E}">
+        <p14:creationId xmlns:p14="http://schemas.microsoft.com/office/powerpoint/2010/main" val="3000554427"/>
+      </p:ext>
+    </p:extLst>
+  </p:cSld>
+  <p:clrMapOvr>
+    <a:masterClrMapping/>
+  </p:clrMapOvr>
+  <mc:AlternateContent xmlns:mc="http://schemas.openxmlformats.org/markup-compatibility/2006">
+    <mc:Choice xmlns:p14="http://schemas.microsoft.com/office/powerpoint/2010/main" Requires="p14">
+      <p:transition spd="slow" p14:dur="1500">
+        <p:split orient="vert"/>
+      </p:transition>
+    </mc:Choice>
+    <mc:Fallback>
+      <p:transition spd="slow">
+        <p:split orient="vert"/>
+      </p:transition>
+    </mc:Fallback>
+  </mc:AlternateContent>
+  <p:timing>
+    <p:tnLst>
+      <p:par>
+        <p:cTn id="1" dur="indefinite" restart="never" nodeType="tmRoot">
+          <p:childTnLst>
+            <p:seq concurrent="1" nextAc="seek">
+              <p:cTn id="2" dur="indefinite" nodeType="mainSeq">
+                <p:childTnLst>
+                  <p:par>
+                    <p:cTn id="3" fill="hold">
+                      <p:stCondLst>
+                        <p:cond delay="indefinite"/>
+                      </p:stCondLst>
+                      <p:childTnLst>
+                        <p:par>
+                          <p:cTn id="4" fill="hold">
+                            <p:stCondLst>
+                              <p:cond delay="0"/>
+                            </p:stCondLst>
+                            <p:childTnLst>
+                              <p:par>
+                                <p:cTn id="5" presetID="53" presetClass="entr" presetSubtype="16" fill="hold" grpId="0" nodeType="clickEffect">
+                                  <p:stCondLst>
+                                    <p:cond delay="0"/>
+                                  </p:stCondLst>
+                                  <p:childTnLst>
+                                    <p:set>
+                                      <p:cBhvr>
+                                        <p:cTn id="6" dur="1" fill="hold">
+                                          <p:stCondLst>
+                                            <p:cond delay="0"/>
+                                          </p:stCondLst>
+                                        </p:cTn>
+                                        <p:tgtEl>
+                                          <p:spTgt spid="4"/>
+                                        </p:tgtEl>
+                                        <p:attrNameLst>
+                                          <p:attrName>style.visibility</p:attrName>
+                                        </p:attrNameLst>
+                                      </p:cBhvr>
+                                      <p:to>
+                                        <p:strVal val="visible"/>
+                                      </p:to>
+                                    </p:set>
+                                    <p:anim calcmode="lin" valueType="num">
+                                      <p:cBhvr>
+                                        <p:cTn id="7" dur="500" fill="hold"/>
+                                        <p:tgtEl>
+                                          <p:spTgt spid="4"/>
+                                        </p:tgtEl>
+                                        <p:attrNameLst>
+                                          <p:attrName>ppt_w</p:attrName>
+                                        </p:attrNameLst>
+                                      </p:cBhvr>
+                                      <p:tavLst>
+                                        <p:tav tm="0">
+                                          <p:val>
+                                            <p:fltVal val="0"/>
+                                          </p:val>
+                                        </p:tav>
+                                        <p:tav tm="100000">
+                                          <p:val>
+                                            <p:strVal val="#ppt_w"/>
+                                          </p:val>
+                                        </p:tav>
+                                      </p:tavLst>
+                                    </p:anim>
+                                    <p:anim calcmode="lin" valueType="num">
+                                      <p:cBhvr>
+                                        <p:cTn id="8" dur="500" fill="hold"/>
+                                        <p:tgtEl>
+                                          <p:spTgt spid="4"/>
+                                        </p:tgtEl>
+                                        <p:attrNameLst>
+                                          <p:attrName>ppt_h</p:attrName>
+                                        </p:attrNameLst>
+                                      </p:cBhvr>
+                                      <p:tavLst>
+                                        <p:tav tm="0">
+                                          <p:val>
+                                            <p:fltVal val="0"/>
+                                          </p:val>
+                                        </p:tav>
+                                        <p:tav tm="100000">
+                                          <p:val>
+                                            <p:strVal val="#ppt_h"/>
+                                          </p:val>
+                                        </p:tav>
+                                      </p:tavLst>
+                                    </p:anim>
+                                    <p:animEffect transition="in" filter="fade">
+                                      <p:cBhvr>
+                                        <p:cTn id="9" dur="500"/>
+                                        <p:tgtEl>
+                                          <p:spTgt spid="4"/>
+                                        </p:tgtEl>
+                                      </p:cBhvr>
+                                    </p:animEffect>
+                                  </p:childTnLst>
+                                </p:cTn>
+                              </p:par>
+                            </p:childTnLst>
+                          </p:cTn>
+                        </p:par>
+                      </p:childTnLst>
+                    </p:cTn>
+                  </p:par>
+                  <p:par>
+                    <p:cTn id="10" fill="hold">
+                      <p:stCondLst>
+                        <p:cond delay="indefinite"/>
+                      </p:stCondLst>
+                      <p:childTnLst>
+                        <p:par>
+                          <p:cTn id="11" fill="hold">
+                            <p:stCondLst>
+                              <p:cond delay="0"/>
+                            </p:stCondLst>
+                            <p:childTnLst>
+                              <p:par>
+                                <p:cTn id="12" presetID="53" presetClass="entr" presetSubtype="16" fill="hold" grpId="0" nodeType="clickEffect">
+                                  <p:stCondLst>
+                                    <p:cond delay="0"/>
+                                  </p:stCondLst>
+                                  <p:childTnLst>
+                                    <p:set>
+                                      <p:cBhvr>
+                                        <p:cTn id="13" dur="1" fill="hold">
+                                          <p:stCondLst>
+                                            <p:cond delay="0"/>
+                                          </p:stCondLst>
+                                        </p:cTn>
+                                        <p:tgtEl>
+                                          <p:spTgt spid="7"/>
+                                        </p:tgtEl>
+                                        <p:attrNameLst>
+                                          <p:attrName>style.visibility</p:attrName>
+                                        </p:attrNameLst>
+                                      </p:cBhvr>
+                                      <p:to>
+                                        <p:strVal val="visible"/>
+                                      </p:to>
+                                    </p:set>
+                                    <p:anim calcmode="lin" valueType="num">
+                                      <p:cBhvr>
+                                        <p:cTn id="14" dur="500" fill="hold"/>
+                                        <p:tgtEl>
+                                          <p:spTgt spid="7"/>
+                                        </p:tgtEl>
+                                        <p:attrNameLst>
+                                          <p:attrName>ppt_w</p:attrName>
+                                        </p:attrNameLst>
+                                      </p:cBhvr>
+                                      <p:tavLst>
+                                        <p:tav tm="0">
+                                          <p:val>
+                                            <p:fltVal val="0"/>
+                                          </p:val>
+                                        </p:tav>
+                                        <p:tav tm="100000">
+                                          <p:val>
+                                            <p:strVal val="#ppt_w"/>
+                                          </p:val>
+                                        </p:tav>
+                                      </p:tavLst>
+                                    </p:anim>
+                                    <p:anim calcmode="lin" valueType="num">
+                                      <p:cBhvr>
+                                        <p:cTn id="15" dur="500" fill="hold"/>
+                                        <p:tgtEl>
+                                          <p:spTgt spid="7"/>
+                                        </p:tgtEl>
+                                        <p:attrNameLst>
+                                          <p:attrName>ppt_h</p:attrName>
+                                        </p:attrNameLst>
+                                      </p:cBhvr>
+                                      <p:tavLst>
+                                        <p:tav tm="0">
+                                          <p:val>
+                                            <p:fltVal val="0"/>
+                                          </p:val>
+                                        </p:tav>
+                                        <p:tav tm="100000">
+                                          <p:val>
+                                            <p:strVal val="#ppt_h"/>
+                                          </p:val>
+                                        </p:tav>
+                                      </p:tavLst>
+                                    </p:anim>
+                                    <p:animEffect transition="in" filter="fade">
+                                      <p:cBhvr>
+                                        <p:cTn id="16" dur="500"/>
+                                        <p:tgtEl>
+                                          <p:spTgt spid="7"/>
+                                        </p:tgtEl>
+                                      </p:cBhvr>
+                                    </p:animEffect>
+                                  </p:childTnLst>
+                                </p:cTn>
+                              </p:par>
+                            </p:childTnLst>
+                          </p:cTn>
+                        </p:par>
+                      </p:childTnLst>
+                    </p:cTn>
+                  </p:par>
+                  <p:par>
+                    <p:cTn id="17" fill="hold">
+                      <p:stCondLst>
+                        <p:cond delay="indefinite"/>
+                      </p:stCondLst>
+                      <p:childTnLst>
+                        <p:par>
+                          <p:cTn id="18" fill="hold">
+                            <p:stCondLst>
+                              <p:cond delay="0"/>
+                            </p:stCondLst>
+                            <p:childTnLst>
+                              <p:par>
+                                <p:cTn id="19" presetID="53" presetClass="entr" presetSubtype="16" fill="hold" grpId="0" nodeType="clickEffect">
+                                  <p:stCondLst>
+                                    <p:cond delay="0"/>
+                                  </p:stCondLst>
+                                  <p:childTnLst>
+                                    <p:set>
+                                      <p:cBhvr>
+                                        <p:cTn id="20" dur="1" fill="hold">
+                                          <p:stCondLst>
+                                            <p:cond delay="0"/>
+                                          </p:stCondLst>
+                                        </p:cTn>
+                                        <p:tgtEl>
+                                          <p:spTgt spid="8"/>
+                                        </p:tgtEl>
+                                        <p:attrNameLst>
+                                          <p:attrName>style.visibility</p:attrName>
+                                        </p:attrNameLst>
+                                      </p:cBhvr>
+                                      <p:to>
+                                        <p:strVal val="visible"/>
+                                      </p:to>
+                                    </p:set>
+                                    <p:anim calcmode="lin" valueType="num">
+                                      <p:cBhvr>
+                                        <p:cTn id="21" dur="500" fill="hold"/>
+                                        <p:tgtEl>
+                                          <p:spTgt spid="8"/>
+                                        </p:tgtEl>
+                                        <p:attrNameLst>
+                                          <p:attrName>ppt_w</p:attrName>
+                                        </p:attrNameLst>
+                                      </p:cBhvr>
+                                      <p:tavLst>
+                                        <p:tav tm="0">
+                                          <p:val>
+                                            <p:fltVal val="0"/>
+                                          </p:val>
+                                        </p:tav>
+                                        <p:tav tm="100000">
+                                          <p:val>
+                                            <p:strVal val="#ppt_w"/>
+                                          </p:val>
+                                        </p:tav>
+                                      </p:tavLst>
+                                    </p:anim>
+                                    <p:anim calcmode="lin" valueType="num">
+                                      <p:cBhvr>
+                                        <p:cTn id="22" dur="500" fill="hold"/>
+                                        <p:tgtEl>
+                                          <p:spTgt spid="8"/>
+                                        </p:tgtEl>
+                                        <p:attrNameLst>
+                                          <p:attrName>ppt_h</p:attrName>
+                                        </p:attrNameLst>
+                                      </p:cBhvr>
+                                      <p:tavLst>
+                                        <p:tav tm="0">
+                                          <p:val>
+                                            <p:fltVal val="0"/>
+                                          </p:val>
+                                        </p:tav>
+                                        <p:tav tm="100000">
+                                          <p:val>
+                                            <p:strVal val="#ppt_h"/>
+                                          </p:val>
+                                        </p:tav>
+                                      </p:tavLst>
+                                    </p:anim>
+                                    <p:animEffect transition="in" filter="fade">
+                                      <p:cBhvr>
+                                        <p:cTn id="23" dur="500"/>
+                                        <p:tgtEl>
+                                          <p:spTgt spid="8"/>
+                                        </p:tgtEl>
+                                      </p:cBhvr>
+                                    </p:animEffect>
+                                  </p:childTnLst>
+                                </p:cTn>
+                              </p:par>
+                            </p:childTnLst>
+                          </p:cTn>
+                        </p:par>
+                      </p:childTnLst>
+                    </p:cTn>
+                  </p:par>
+                  <p:par>
+                    <p:cTn id="24" fill="hold">
+                      <p:stCondLst>
+                        <p:cond delay="indefinite"/>
+                      </p:stCondLst>
+                      <p:childTnLst>
+                        <p:par>
+                          <p:cTn id="25" fill="hold">
+                            <p:stCondLst>
+                              <p:cond delay="0"/>
+                            </p:stCondLst>
+                            <p:childTnLst>
+                              <p:par>
+                                <p:cTn id="26" presetID="53" presetClass="entr" presetSubtype="16" fill="hold" grpId="0" nodeType="clickEffect">
+                                  <p:stCondLst>
+                                    <p:cond delay="0"/>
+                                  </p:stCondLst>
+                                  <p:childTnLst>
+                                    <p:set>
+                                      <p:cBhvr>
+                                        <p:cTn id="27" dur="1" fill="hold">
+                                          <p:stCondLst>
+                                            <p:cond delay="0"/>
+                                          </p:stCondLst>
+                                        </p:cTn>
+                                        <p:tgtEl>
+                                          <p:spTgt spid="9"/>
+                                        </p:tgtEl>
+                                        <p:attrNameLst>
+                                          <p:attrName>style.visibility</p:attrName>
+                                        </p:attrNameLst>
+                                      </p:cBhvr>
+                                      <p:to>
+                                        <p:strVal val="visible"/>
+                                      </p:to>
+                                    </p:set>
+                                    <p:anim calcmode="lin" valueType="num">
+                                      <p:cBhvr>
+                                        <p:cTn id="28" dur="500" fill="hold"/>
+                                        <p:tgtEl>
+                                          <p:spTgt spid="9"/>
+                                        </p:tgtEl>
+                                        <p:attrNameLst>
+                                          <p:attrName>ppt_w</p:attrName>
+                                        </p:attrNameLst>
+                                      </p:cBhvr>
+                                      <p:tavLst>
+                                        <p:tav tm="0">
+                                          <p:val>
+                                            <p:fltVal val="0"/>
+                                          </p:val>
+                                        </p:tav>
+                                        <p:tav tm="100000">
+                                          <p:val>
+                                            <p:strVal val="#ppt_w"/>
+                                          </p:val>
+                                        </p:tav>
+                                      </p:tavLst>
+                                    </p:anim>
+                                    <p:anim calcmode="lin" valueType="num">
+                                      <p:cBhvr>
+                                        <p:cTn id="29" dur="500" fill="hold"/>
+                                        <p:tgtEl>
+                                          <p:spTgt spid="9"/>
+                                        </p:tgtEl>
+                                        <p:attrNameLst>
+                                          <p:attrName>ppt_h</p:attrName>
+                                        </p:attrNameLst>
+                                      </p:cBhvr>
+                                      <p:tavLst>
+                                        <p:tav tm="0">
+                                          <p:val>
+                                            <p:fltVal val="0"/>
+                                          </p:val>
+                                        </p:tav>
+                                        <p:tav tm="100000">
+                                          <p:val>
+                                            <p:strVal val="#ppt_h"/>
+                                          </p:val>
+                                        </p:tav>
+                                      </p:tavLst>
+                                    </p:anim>
+                                    <p:animEffect transition="in" filter="fade">
+                                      <p:cBhvr>
+                                        <p:cTn id="30" dur="500"/>
+                                        <p:tgtEl>
+                                          <p:spTgt spid="9"/>
+                                        </p:tgtEl>
+                                      </p:cBhvr>
+                                    </p:animEffect>
+                                  </p:childTnLst>
+                                </p:cTn>
+                              </p:par>
+                            </p:childTnLst>
+                          </p:cTn>
+                        </p:par>
+                      </p:childTnLst>
+                    </p:cTn>
+                  </p:par>
+                </p:childTnLst>
+              </p:cTn>
+              <p:prevCondLst>
+                <p:cond evt="onPrev" delay="0">
+                  <p:tgtEl>
+                    <p:sldTgt/>
+                  </p:tgtEl>
+                </p:cond>
+              </p:prevCondLst>
+              <p:nextCondLst>
+                <p:cond evt="onNext" delay="0">
+                  <p:tgtEl>
+                    <p:sldTgt/>
+                  </p:tgtEl>
+                </p:cond>
+              </p:nextCondLst>
+            </p:seq>
+          </p:childTnLst>
+        </p:cTn>
+      </p:par>
+    </p:tnLst>
+    <p:bldLst>
+      <p:bldP spid="4" grpId="0" animBg="1"/>
+      <p:bldP spid="7" grpId="0" animBg="1"/>
+      <p:bldP spid="8" grpId="0" animBg="1"/>
+      <p:bldP spid="9" grpId="0"/>
+    </p:bldLst>
+  </p:timing>
+</p:sld>
+</file>
+
+<file path=ppt/slides/slide4.xml><?xml version="1.0" encoding="utf-8"?>
+<p:sld xmlns:a="http://schemas.openxmlformats.org/drawingml/2006/main" xmlns:r="http://schemas.openxmlformats.org/officeDocument/2006/relationships" xmlns:p="http://schemas.openxmlformats.org/presentationml/2006/main">
+  <p:cSld>
+    <p:bg>
+      <p:bgPr>
+        <a:solidFill>
+          <a:schemeClr val="bg1">
+            <a:lumMod val="50000"/>
+          </a:schemeClr>
+        </a:solidFill>
+        <a:effectLst/>
+      </p:bgPr>
+    </p:bg>
+    <p:spTree>
+      <p:nvGrpSpPr>
+        <p:cNvPr id="1" name=""/>
+        <p:cNvGrpSpPr/>
+        <p:nvPr/>
+      </p:nvGrpSpPr>
+      <p:grpSpPr>
+        <a:xfrm>
+          <a:off x="0" y="0"/>
+          <a:ext cx="0" cy="0"/>
+          <a:chOff x="0" y="0"/>
+          <a:chExt cx="0" cy="0"/>
+        </a:xfrm>
+      </p:grpSpPr>
+      <p:sp>
+        <p:nvSpPr>
+          <p:cNvPr id="2" name="Title 1">
+            <a:extLst>
+              <a:ext uri="{FF2B5EF4-FFF2-40B4-BE49-F238E27FC236}">
+                <a16:creationId xmlns:a16="http://schemas.microsoft.com/office/drawing/2014/main" id="{E059DEB9-95EC-8A25-2ADE-438DE3F8654D}"/>
+              </a:ext>
+            </a:extLst>
+          </p:cNvPr>
+          <p:cNvSpPr>
+            <a:spLocks noGrp="1"/>
+          </p:cNvSpPr>
+          <p:nvPr>
+            <p:ph type="title"/>
+          </p:nvPr>
+        </p:nvSpPr>
+        <p:spPr>
+          <a:xfrm>
+            <a:off x="4113584" y="267849"/>
+            <a:ext cx="3964832" cy="559003"/>
+          </a:xfrm>
+        </p:spPr>
+        <p:txBody>
+          <a:bodyPr>
+            <a:normAutofit/>
+          </a:bodyPr>
+          <a:lstStyle/>
+          <a:p>
+            <a:pPr algn="ctr"/>
+            <a:r>
+              <a:rPr lang="en-US" sz="2400" dirty="0">
+                <a:solidFill>
+                  <a:schemeClr val="bg1"/>
+                </a:solidFill>
+                <a:latin typeface="Algerian" panose="04020705040A02060702" pitchFamily="82" charset="0"/>
+              </a:rPr>
+              <a:t>Further Investigations</a:t>
+            </a:r>
+          </a:p>
+        </p:txBody>
+      </p:sp>
+      <p:sp>
+        <p:nvSpPr>
+          <p:cNvPr id="3" name="Rectangle: Rounded Corners 2">
+            <a:extLst>
+              <a:ext uri="{FF2B5EF4-FFF2-40B4-BE49-F238E27FC236}">
+                <a16:creationId xmlns:a16="http://schemas.microsoft.com/office/drawing/2014/main" id="{02EDDB0F-54CB-6A9A-92AE-1EE9B2725F4B}"/>
+              </a:ext>
+            </a:extLst>
+          </p:cNvPr>
+          <p:cNvSpPr/>
+          <p:nvPr/>
+        </p:nvSpPr>
+        <p:spPr>
+          <a:xfrm>
+            <a:off x="5137825" y="2927689"/>
+            <a:ext cx="1916349" cy="982494"/>
+          </a:xfrm>
+          <a:prstGeom prst="roundRect">
+            <a:avLst/>
+          </a:prstGeom>
+          <a:solidFill>
+            <a:schemeClr val="bg1"/>
+          </a:solidFill>
+        </p:spPr>
+        <p:style>
+          <a:lnRef idx="2">
+            <a:schemeClr val="accent1">
+              <a:shade val="15000"/>
+            </a:schemeClr>
+          </a:lnRef>
+          <a:fillRef idx="1">
+            <a:schemeClr val="accent1"/>
+          </a:fillRef>
+          <a:effectRef idx="0">
+            <a:schemeClr val="accent1"/>
+          </a:effectRef>
+          <a:fontRef idx="minor">
+            <a:schemeClr val="lt1"/>
+          </a:fontRef>
+        </p:style>
+        <p:txBody>
+          <a:bodyPr rtlCol="0" anchor="ctr"/>
+          <a:lstStyle/>
+          <a:p>
+            <a:pPr algn="ctr"/>
+            <a:r>
+              <a:rPr lang="en-US" b="1" dirty="0">
+                <a:solidFill>
+                  <a:schemeClr val="tx1"/>
+                </a:solidFill>
+              </a:rPr>
+              <a:t>Several issues need a closer look</a:t>
+            </a:r>
+          </a:p>
+        </p:txBody>
+      </p:sp>
+      <p:sp>
+        <p:nvSpPr>
+          <p:cNvPr id="4" name="Rectangle: Rounded Corners 3">
+            <a:extLst>
+              <a:ext uri="{FF2B5EF4-FFF2-40B4-BE49-F238E27FC236}">
+                <a16:creationId xmlns:a16="http://schemas.microsoft.com/office/drawing/2014/main" id="{83BDDDC5-15AA-60D6-0F92-52091E3B6BD2}"/>
+              </a:ext>
+            </a:extLst>
+          </p:cNvPr>
+          <p:cNvSpPr/>
+          <p:nvPr/>
+        </p:nvSpPr>
+        <p:spPr>
+          <a:xfrm>
+            <a:off x="2451370" y="1018162"/>
+            <a:ext cx="1750979" cy="1157591"/>
+          </a:xfrm>
+          <a:prstGeom prst="roundRect">
+            <a:avLst/>
+          </a:prstGeom>
+          <a:solidFill>
+            <a:schemeClr val="bg1"/>
+          </a:solidFill>
+        </p:spPr>
+        <p:style>
+          <a:lnRef idx="2">
+            <a:schemeClr val="accent1">
+              <a:shade val="15000"/>
+            </a:schemeClr>
+          </a:lnRef>
+          <a:fillRef idx="1">
+            <a:schemeClr val="accent1"/>
+          </a:fillRef>
+          <a:effectRef idx="0">
+            <a:schemeClr val="accent1"/>
+          </a:effectRef>
+          <a:fontRef idx="minor">
+            <a:schemeClr val="lt1"/>
+          </a:fontRef>
+        </p:style>
+        <p:txBody>
+          <a:bodyPr rtlCol="0" anchor="t"/>
+          <a:lstStyle/>
+          <a:p>
+            <a:pPr algn="ctr"/>
+            <a:r>
+              <a:rPr lang="en-US" sz="1200" b="1" dirty="0">
+                <a:solidFill>
+                  <a:schemeClr val="tx1"/>
+                </a:solidFill>
+              </a:rPr>
+              <a:t>Issue 1</a:t>
+            </a:r>
+          </a:p>
+          <a:p>
+            <a:pPr algn="just"/>
+            <a:r>
+              <a:rPr lang="en-US" sz="1000" dirty="0">
+                <a:solidFill>
+                  <a:schemeClr val="tx1"/>
+                </a:solidFill>
+              </a:rPr>
+              <a:t>What was the drug initially prescribed for? Does the adverse effects differs depending on that?</a:t>
+            </a:r>
+          </a:p>
+        </p:txBody>
+      </p:sp>
+      <p:sp>
+        <p:nvSpPr>
+          <p:cNvPr id="5" name="Rectangle: Rounded Corners 4">
+            <a:extLst>
+              <a:ext uri="{FF2B5EF4-FFF2-40B4-BE49-F238E27FC236}">
+                <a16:creationId xmlns:a16="http://schemas.microsoft.com/office/drawing/2014/main" id="{2B104857-69B0-3E38-D31D-333E080DBBF3}"/>
+              </a:ext>
+            </a:extLst>
+          </p:cNvPr>
+          <p:cNvSpPr/>
+          <p:nvPr/>
+        </p:nvSpPr>
+        <p:spPr>
+          <a:xfrm>
+            <a:off x="5220509" y="1018162"/>
+            <a:ext cx="1750979" cy="1157591"/>
+          </a:xfrm>
+          <a:prstGeom prst="roundRect">
+            <a:avLst/>
+          </a:prstGeom>
+          <a:solidFill>
+            <a:schemeClr val="bg1"/>
+          </a:solidFill>
+        </p:spPr>
+        <p:style>
+          <a:lnRef idx="2">
+            <a:schemeClr val="accent1">
+              <a:shade val="15000"/>
+            </a:schemeClr>
+          </a:lnRef>
+          <a:fillRef idx="1">
+            <a:schemeClr val="accent1"/>
+          </a:fillRef>
+          <a:effectRef idx="0">
+            <a:schemeClr val="accent1"/>
+          </a:effectRef>
+          <a:fontRef idx="minor">
+            <a:schemeClr val="lt1"/>
+          </a:fontRef>
+        </p:style>
+        <p:txBody>
+          <a:bodyPr rtlCol="0" anchor="t"/>
+          <a:lstStyle/>
+          <a:p>
+            <a:pPr algn="ctr"/>
+            <a:r>
+              <a:rPr lang="en-US" sz="1200" b="1" dirty="0">
+                <a:solidFill>
+                  <a:schemeClr val="tx1"/>
+                </a:solidFill>
+              </a:rPr>
+              <a:t>Issue 2</a:t>
+            </a:r>
+          </a:p>
+          <a:p>
+            <a:pPr algn="just"/>
+            <a:endParaRPr lang="en-US" sz="1200" b="1" dirty="0">
+              <a:solidFill>
+                <a:schemeClr val="tx1"/>
+              </a:solidFill>
+            </a:endParaRPr>
+          </a:p>
+          <a:p>
+            <a:pPr algn="just"/>
+            <a:r>
+              <a:rPr lang="en-US" sz="1000" dirty="0">
+                <a:solidFill>
+                  <a:schemeClr val="tx1"/>
+                </a:solidFill>
+              </a:rPr>
+              <a:t>Are there any adverse effects resulting from co-medications?</a:t>
+            </a:r>
+          </a:p>
+        </p:txBody>
+      </p:sp>
+      <p:sp>
+        <p:nvSpPr>
+          <p:cNvPr id="6" name="Rectangle: Rounded Corners 5">
+            <a:extLst>
+              <a:ext uri="{FF2B5EF4-FFF2-40B4-BE49-F238E27FC236}">
+                <a16:creationId xmlns:a16="http://schemas.microsoft.com/office/drawing/2014/main" id="{2D4DFF8B-75FE-D356-0E2A-83EFCEFF2F24}"/>
+              </a:ext>
+            </a:extLst>
+          </p:cNvPr>
+          <p:cNvSpPr/>
+          <p:nvPr/>
+        </p:nvSpPr>
+        <p:spPr>
+          <a:xfrm>
+            <a:off x="2362605" y="2840140"/>
+            <a:ext cx="1750979" cy="1157591"/>
+          </a:xfrm>
+          <a:prstGeom prst="roundRect">
+            <a:avLst/>
+          </a:prstGeom>
+          <a:solidFill>
+            <a:schemeClr val="bg1"/>
+          </a:solidFill>
+        </p:spPr>
+        <p:style>
+          <a:lnRef idx="2">
+            <a:schemeClr val="accent1">
+              <a:shade val="15000"/>
+            </a:schemeClr>
+          </a:lnRef>
+          <a:fillRef idx="1">
+            <a:schemeClr val="accent1"/>
+          </a:fillRef>
+          <a:effectRef idx="0">
+            <a:schemeClr val="accent1"/>
+          </a:effectRef>
+          <a:fontRef idx="minor">
+            <a:schemeClr val="lt1"/>
+          </a:fontRef>
+        </p:style>
+        <p:txBody>
+          <a:bodyPr rtlCol="0" anchor="t"/>
+          <a:lstStyle/>
+          <a:p>
+            <a:pPr algn="ctr"/>
+            <a:r>
+              <a:rPr lang="en-US" sz="1200" b="1" dirty="0">
+                <a:solidFill>
+                  <a:schemeClr val="tx1"/>
+                </a:solidFill>
+              </a:rPr>
+              <a:t>Issue 4</a:t>
+            </a:r>
+          </a:p>
+          <a:p>
+            <a:pPr algn="ctr"/>
+            <a:endParaRPr lang="en-US" sz="1200" b="1" dirty="0">
+              <a:solidFill>
+                <a:schemeClr val="tx1"/>
+              </a:solidFill>
+            </a:endParaRPr>
+          </a:p>
+          <a:p>
+            <a:pPr algn="just"/>
+            <a:r>
+              <a:rPr lang="en-US" sz="1000" dirty="0">
+                <a:solidFill>
+                  <a:schemeClr val="tx1"/>
+                </a:solidFill>
+              </a:rPr>
+              <a:t>What are the long term vs short term adverse effects of the drugs?</a:t>
+            </a:r>
+          </a:p>
+        </p:txBody>
+      </p:sp>
+      <p:sp>
+        <p:nvSpPr>
+          <p:cNvPr id="7" name="Rectangle: Rounded Corners 6">
+            <a:extLst>
+              <a:ext uri="{FF2B5EF4-FFF2-40B4-BE49-F238E27FC236}">
+                <a16:creationId xmlns:a16="http://schemas.microsoft.com/office/drawing/2014/main" id="{EC075FD1-1FA4-97FD-A084-C94E08A0A538}"/>
+              </a:ext>
+            </a:extLst>
+          </p:cNvPr>
+          <p:cNvSpPr/>
+          <p:nvPr/>
+        </p:nvSpPr>
+        <p:spPr>
+          <a:xfrm>
+            <a:off x="7989648" y="1018162"/>
+            <a:ext cx="1750979" cy="1157591"/>
+          </a:xfrm>
+          <a:prstGeom prst="roundRect">
+            <a:avLst/>
+          </a:prstGeom>
+          <a:solidFill>
+            <a:schemeClr val="bg1"/>
+          </a:solidFill>
+        </p:spPr>
+        <p:style>
+          <a:lnRef idx="2">
+            <a:schemeClr val="accent1">
+              <a:shade val="15000"/>
+            </a:schemeClr>
+          </a:lnRef>
+          <a:fillRef idx="1">
+            <a:schemeClr val="accent1"/>
+          </a:fillRef>
+          <a:effectRef idx="0">
+            <a:schemeClr val="accent1"/>
+          </a:effectRef>
+          <a:fontRef idx="minor">
+            <a:schemeClr val="lt1"/>
+          </a:fontRef>
+        </p:style>
+        <p:txBody>
+          <a:bodyPr rtlCol="0" anchor="t"/>
+          <a:lstStyle/>
+          <a:p>
+            <a:pPr algn="ctr"/>
+            <a:r>
+              <a:rPr lang="en-US" sz="1200" b="1" dirty="0">
+                <a:solidFill>
+                  <a:schemeClr val="tx1"/>
+                </a:solidFill>
+              </a:rPr>
+              <a:t>Issue 3</a:t>
+            </a:r>
+          </a:p>
+          <a:p>
+            <a:pPr algn="just"/>
+            <a:r>
+              <a:rPr lang="en-US" sz="1000" dirty="0">
+                <a:solidFill>
+                  <a:schemeClr val="tx1"/>
+                </a:solidFill>
+              </a:rPr>
+              <a:t>Do adverse effects of drugs depend on other factors such as demographic data of the patient?</a:t>
+            </a:r>
+          </a:p>
+        </p:txBody>
+      </p:sp>
+      <p:sp>
+        <p:nvSpPr>
+          <p:cNvPr id="8" name="Rectangle: Rounded Corners 7">
+            <a:extLst>
+              <a:ext uri="{FF2B5EF4-FFF2-40B4-BE49-F238E27FC236}">
+                <a16:creationId xmlns:a16="http://schemas.microsoft.com/office/drawing/2014/main" id="{F53B36DD-527A-1E10-DA73-06441914C7C0}"/>
+              </a:ext>
+            </a:extLst>
+          </p:cNvPr>
+          <p:cNvSpPr/>
+          <p:nvPr/>
+        </p:nvSpPr>
+        <p:spPr>
+          <a:xfrm>
+            <a:off x="7989647" y="2850203"/>
+            <a:ext cx="1750979" cy="1157591"/>
+          </a:xfrm>
+          <a:prstGeom prst="roundRect">
+            <a:avLst/>
+          </a:prstGeom>
+          <a:solidFill>
+            <a:schemeClr val="bg1"/>
+          </a:solidFill>
+        </p:spPr>
+        <p:style>
+          <a:lnRef idx="2">
+            <a:schemeClr val="accent1">
+              <a:shade val="15000"/>
+            </a:schemeClr>
+          </a:lnRef>
+          <a:fillRef idx="1">
+            <a:schemeClr val="accent1"/>
+          </a:fillRef>
+          <a:effectRef idx="0">
+            <a:schemeClr val="accent1"/>
+          </a:effectRef>
+          <a:fontRef idx="minor">
+            <a:schemeClr val="lt1"/>
+          </a:fontRef>
+        </p:style>
+        <p:txBody>
+          <a:bodyPr rtlCol="0" anchor="t"/>
+          <a:lstStyle/>
+          <a:p>
+            <a:pPr algn="ctr"/>
+            <a:r>
+              <a:rPr lang="en-US" sz="1200" b="1" dirty="0">
+                <a:solidFill>
+                  <a:schemeClr val="tx1"/>
+                </a:solidFill>
+              </a:rPr>
+              <a:t>Issue 5</a:t>
+            </a:r>
+          </a:p>
+          <a:p>
+            <a:pPr algn="just"/>
+            <a:r>
+              <a:rPr lang="en-US" sz="1000" dirty="0">
+                <a:solidFill>
+                  <a:schemeClr val="tx1"/>
+                </a:solidFill>
+              </a:rPr>
+              <a:t>Can adverse effects be treated by other drugs? In case of TRAMAL, a medication for nausea or pyrexia?</a:t>
+            </a:r>
+          </a:p>
+        </p:txBody>
+      </p:sp>
+      <p:sp>
+        <p:nvSpPr>
+          <p:cNvPr id="9" name="Rectangle: Rounded Corners 8">
+            <a:extLst>
+              <a:ext uri="{FF2B5EF4-FFF2-40B4-BE49-F238E27FC236}">
+                <a16:creationId xmlns:a16="http://schemas.microsoft.com/office/drawing/2014/main" id="{72189EB6-FE0E-D743-3144-336BA178B45F}"/>
+              </a:ext>
+            </a:extLst>
+          </p:cNvPr>
+          <p:cNvSpPr/>
+          <p:nvPr/>
+        </p:nvSpPr>
+        <p:spPr>
+          <a:xfrm>
+            <a:off x="2441642" y="4682247"/>
+            <a:ext cx="1750979" cy="1157591"/>
+          </a:xfrm>
+          <a:prstGeom prst="roundRect">
+            <a:avLst/>
+          </a:prstGeom>
+          <a:solidFill>
+            <a:schemeClr val="bg1"/>
+          </a:solidFill>
+        </p:spPr>
+        <p:style>
+          <a:lnRef idx="2">
+            <a:schemeClr val="accent1">
+              <a:shade val="15000"/>
+            </a:schemeClr>
+          </a:lnRef>
+          <a:fillRef idx="1">
+            <a:schemeClr val="accent1"/>
+          </a:fillRef>
+          <a:effectRef idx="0">
+            <a:schemeClr val="accent1"/>
+          </a:effectRef>
+          <a:fontRef idx="minor">
+            <a:schemeClr val="lt1"/>
+          </a:fontRef>
+        </p:style>
+        <p:txBody>
+          <a:bodyPr rtlCol="0" anchor="t"/>
+          <a:lstStyle/>
+          <a:p>
+            <a:pPr algn="ctr"/>
+            <a:r>
+              <a:rPr lang="en-US" sz="1200" b="1" dirty="0">
+                <a:solidFill>
+                  <a:schemeClr val="tx1"/>
+                </a:solidFill>
+              </a:rPr>
+              <a:t>Issue 6</a:t>
+            </a:r>
+          </a:p>
+          <a:p>
+            <a:pPr algn="just"/>
+            <a:r>
+              <a:rPr lang="en-US" sz="1000" dirty="0">
+                <a:solidFill>
+                  <a:schemeClr val="tx1"/>
+                </a:solidFill>
+              </a:rPr>
+              <a:t>What is the severity of the adverse effects on the overall well-being of the patient?</a:t>
+            </a:r>
+          </a:p>
+        </p:txBody>
+      </p:sp>
+      <p:sp>
+        <p:nvSpPr>
+          <p:cNvPr id="10" name="Rectangle: Rounded Corners 9">
+            <a:extLst>
+              <a:ext uri="{FF2B5EF4-FFF2-40B4-BE49-F238E27FC236}">
+                <a16:creationId xmlns:a16="http://schemas.microsoft.com/office/drawing/2014/main" id="{C5DF9852-31A6-991B-A526-72E1E169E2AC}"/>
+              </a:ext>
+            </a:extLst>
+          </p:cNvPr>
+          <p:cNvSpPr/>
+          <p:nvPr/>
+        </p:nvSpPr>
+        <p:spPr>
+          <a:xfrm>
+            <a:off x="5220509" y="4662118"/>
+            <a:ext cx="1750979" cy="1157591"/>
+          </a:xfrm>
+          <a:prstGeom prst="roundRect">
+            <a:avLst/>
+          </a:prstGeom>
+          <a:solidFill>
+            <a:schemeClr val="bg1"/>
+          </a:solidFill>
+        </p:spPr>
+        <p:style>
+          <a:lnRef idx="2">
+            <a:schemeClr val="accent1">
+              <a:shade val="15000"/>
+            </a:schemeClr>
+          </a:lnRef>
+          <a:fillRef idx="1">
+            <a:schemeClr val="accent1"/>
+          </a:fillRef>
+          <a:effectRef idx="0">
+            <a:schemeClr val="accent1"/>
+          </a:effectRef>
+          <a:fontRef idx="minor">
+            <a:schemeClr val="lt1"/>
+          </a:fontRef>
+        </p:style>
+        <p:txBody>
+          <a:bodyPr rtlCol="0" anchor="t"/>
+          <a:lstStyle/>
+          <a:p>
+            <a:pPr algn="ctr"/>
+            <a:r>
+              <a:rPr lang="en-US" sz="1200" b="1" dirty="0">
+                <a:solidFill>
+                  <a:schemeClr val="tx1"/>
+                </a:solidFill>
+              </a:rPr>
+              <a:t>Issue 7</a:t>
+            </a:r>
+          </a:p>
+          <a:p>
+            <a:pPr algn="just"/>
+            <a:r>
+              <a:rPr lang="en-US" sz="1000" dirty="0">
+                <a:solidFill>
+                  <a:schemeClr val="tx1"/>
+                </a:solidFill>
+              </a:rPr>
+              <a:t>Are certain adverse effects reported more than others and does that bias the data?</a:t>
+            </a:r>
+          </a:p>
+        </p:txBody>
+      </p:sp>
+      <p:sp>
+        <p:nvSpPr>
+          <p:cNvPr id="11" name="Rectangle: Rounded Corners 10">
+            <a:extLst>
+              <a:ext uri="{FF2B5EF4-FFF2-40B4-BE49-F238E27FC236}">
+                <a16:creationId xmlns:a16="http://schemas.microsoft.com/office/drawing/2014/main" id="{4090EBBA-D919-4B61-9FAA-21F970A1F1CF}"/>
+              </a:ext>
+            </a:extLst>
+          </p:cNvPr>
+          <p:cNvSpPr/>
+          <p:nvPr/>
+        </p:nvSpPr>
+        <p:spPr>
+          <a:xfrm>
+            <a:off x="8078416" y="4662118"/>
+            <a:ext cx="1750979" cy="1157591"/>
+          </a:xfrm>
+          <a:prstGeom prst="roundRect">
+            <a:avLst/>
+          </a:prstGeom>
+          <a:solidFill>
+            <a:schemeClr val="bg1"/>
+          </a:solidFill>
+        </p:spPr>
+        <p:style>
+          <a:lnRef idx="2">
+            <a:schemeClr val="accent1">
+              <a:shade val="15000"/>
+            </a:schemeClr>
+          </a:lnRef>
+          <a:fillRef idx="1">
+            <a:schemeClr val="accent1"/>
+          </a:fillRef>
+          <a:effectRef idx="0">
+            <a:schemeClr val="accent1"/>
+          </a:effectRef>
+          <a:fontRef idx="minor">
+            <a:schemeClr val="lt1"/>
+          </a:fontRef>
+        </p:style>
+        <p:txBody>
+          <a:bodyPr rtlCol="0" anchor="t"/>
+          <a:lstStyle/>
+          <a:p>
+            <a:pPr algn="ctr"/>
+            <a:r>
+              <a:rPr lang="en-US" sz="1200" b="1" dirty="0">
+                <a:solidFill>
+                  <a:schemeClr val="tx1"/>
+                </a:solidFill>
+              </a:rPr>
+              <a:t>Issue 8</a:t>
+            </a:r>
+          </a:p>
+          <a:p>
+            <a:pPr algn="just"/>
+            <a:r>
+              <a:rPr lang="en-US" sz="1000" dirty="0">
+                <a:solidFill>
+                  <a:schemeClr val="tx1"/>
+                </a:solidFill>
+              </a:rPr>
+              <a:t>Can all casual adverse effects (especially long-term) be linked to current drug use?</a:t>
+            </a:r>
+          </a:p>
+        </p:txBody>
+      </p:sp>
+      <p:cxnSp>
+        <p:nvCxnSpPr>
+          <p:cNvPr id="13" name="Straight Arrow Connector 12">
+            <a:extLst>
+              <a:ext uri="{FF2B5EF4-FFF2-40B4-BE49-F238E27FC236}">
+                <a16:creationId xmlns:a16="http://schemas.microsoft.com/office/drawing/2014/main" id="{664C5880-191F-41E6-B8EE-DF82B2569AB2}"/>
+              </a:ext>
+            </a:extLst>
+          </p:cNvPr>
+          <p:cNvCxnSpPr>
+            <a:cxnSpLocks/>
+            <a:stCxn id="3" idx="0"/>
+            <a:endCxn id="5" idx="2"/>
+          </p:cNvCxnSpPr>
+          <p:nvPr/>
+        </p:nvCxnSpPr>
+        <p:spPr>
+          <a:xfrm flipH="1" flipV="1">
+            <a:off x="6095999" y="2175753"/>
+            <a:ext cx="1" cy="751936"/>
+          </a:xfrm>
+          <a:prstGeom prst="straightConnector1">
+            <a:avLst/>
+          </a:prstGeom>
+          <a:ln>
+            <a:solidFill>
+              <a:schemeClr val="bg1"/>
+            </a:solidFill>
+            <a:tailEnd type="triangle"/>
+          </a:ln>
+        </p:spPr>
+        <p:style>
+          <a:lnRef idx="1">
+            <a:schemeClr val="accent1"/>
+          </a:lnRef>
+          <a:fillRef idx="0">
+            <a:schemeClr val="accent1"/>
+          </a:fillRef>
+          <a:effectRef idx="0">
+            <a:schemeClr val="accent1"/>
+          </a:effectRef>
+          <a:fontRef idx="minor">
+            <a:schemeClr val="tx1"/>
+          </a:fontRef>
+        </p:style>
+      </p:cxnSp>
+      <p:cxnSp>
+        <p:nvCxnSpPr>
+          <p:cNvPr id="18" name="Straight Arrow Connector 17">
+            <a:extLst>
+              <a:ext uri="{FF2B5EF4-FFF2-40B4-BE49-F238E27FC236}">
+                <a16:creationId xmlns:a16="http://schemas.microsoft.com/office/drawing/2014/main" id="{B2823723-09F3-9AC2-8D42-C7E1F59F9B1E}"/>
+              </a:ext>
+            </a:extLst>
+          </p:cNvPr>
+          <p:cNvCxnSpPr>
+            <a:stCxn id="3" idx="1"/>
+            <a:endCxn id="6" idx="3"/>
+          </p:cNvCxnSpPr>
+          <p:nvPr/>
+        </p:nvCxnSpPr>
+        <p:spPr>
+          <a:xfrm flipH="1">
+            <a:off x="4113584" y="3418936"/>
+            <a:ext cx="1024241" cy="0"/>
+          </a:xfrm>
+          <a:prstGeom prst="straightConnector1">
+            <a:avLst/>
+          </a:prstGeom>
+          <a:ln>
+            <a:solidFill>
+              <a:schemeClr val="bg1"/>
+            </a:solidFill>
+            <a:tailEnd type="triangle"/>
+          </a:ln>
+        </p:spPr>
+        <p:style>
+          <a:lnRef idx="1">
+            <a:schemeClr val="accent1"/>
+          </a:lnRef>
+          <a:fillRef idx="0">
+            <a:schemeClr val="accent1"/>
+          </a:fillRef>
+          <a:effectRef idx="0">
+            <a:schemeClr val="accent1"/>
+          </a:effectRef>
+          <a:fontRef idx="minor">
+            <a:schemeClr val="tx1"/>
+          </a:fontRef>
+        </p:style>
+      </p:cxnSp>
+      <p:cxnSp>
+        <p:nvCxnSpPr>
+          <p:cNvPr id="20" name="Straight Arrow Connector 19">
+            <a:extLst>
+              <a:ext uri="{FF2B5EF4-FFF2-40B4-BE49-F238E27FC236}">
+                <a16:creationId xmlns:a16="http://schemas.microsoft.com/office/drawing/2014/main" id="{541195F8-4741-B587-5180-E8EE84CDE10B}"/>
+              </a:ext>
+            </a:extLst>
+          </p:cNvPr>
+          <p:cNvCxnSpPr>
+            <a:stCxn id="3" idx="3"/>
+            <a:endCxn id="8" idx="1"/>
+          </p:cNvCxnSpPr>
+          <p:nvPr/>
+        </p:nvCxnSpPr>
+        <p:spPr>
+          <a:xfrm>
+            <a:off x="7054174" y="3418936"/>
+            <a:ext cx="935473" cy="10063"/>
+          </a:xfrm>
+          <a:prstGeom prst="straightConnector1">
+            <a:avLst/>
+          </a:prstGeom>
+          <a:ln>
+            <a:solidFill>
+              <a:schemeClr val="bg2"/>
+            </a:solidFill>
+            <a:tailEnd type="triangle"/>
+          </a:ln>
+        </p:spPr>
+        <p:style>
+          <a:lnRef idx="1">
+            <a:schemeClr val="accent1"/>
+          </a:lnRef>
+          <a:fillRef idx="0">
+            <a:schemeClr val="accent1"/>
+          </a:fillRef>
+          <a:effectRef idx="0">
+            <a:schemeClr val="accent1"/>
+          </a:effectRef>
+          <a:fontRef idx="minor">
+            <a:schemeClr val="tx1"/>
+          </a:fontRef>
+        </p:style>
+      </p:cxnSp>
+      <p:cxnSp>
+        <p:nvCxnSpPr>
+          <p:cNvPr id="24" name="Straight Arrow Connector 23">
+            <a:extLst>
+              <a:ext uri="{FF2B5EF4-FFF2-40B4-BE49-F238E27FC236}">
+                <a16:creationId xmlns:a16="http://schemas.microsoft.com/office/drawing/2014/main" id="{2AE84FC7-C602-5965-2F09-6DD2D58A82B2}"/>
+              </a:ext>
+            </a:extLst>
+          </p:cNvPr>
+          <p:cNvCxnSpPr>
+            <a:stCxn id="3" idx="2"/>
+            <a:endCxn id="10" idx="0"/>
+          </p:cNvCxnSpPr>
+          <p:nvPr/>
+        </p:nvCxnSpPr>
+        <p:spPr>
+          <a:xfrm flipH="1">
+            <a:off x="6095999" y="3910183"/>
+            <a:ext cx="1" cy="751935"/>
+          </a:xfrm>
+          <a:prstGeom prst="straightConnector1">
+            <a:avLst/>
+          </a:prstGeom>
+          <a:ln>
+            <a:solidFill>
+              <a:schemeClr val="bg1"/>
+            </a:solidFill>
+            <a:tailEnd type="triangle"/>
+          </a:ln>
+        </p:spPr>
+        <p:style>
+          <a:lnRef idx="1">
+            <a:schemeClr val="accent1"/>
+          </a:lnRef>
+          <a:fillRef idx="0">
+            <a:schemeClr val="accent1"/>
+          </a:fillRef>
+          <a:effectRef idx="0">
+            <a:schemeClr val="accent1"/>
+          </a:effectRef>
+          <a:fontRef idx="minor">
+            <a:schemeClr val="tx1"/>
+          </a:fontRef>
+        </p:style>
+      </p:cxnSp>
+      <p:cxnSp>
+        <p:nvCxnSpPr>
+          <p:cNvPr id="26" name="Straight Arrow Connector 25">
+            <a:extLst>
+              <a:ext uri="{FF2B5EF4-FFF2-40B4-BE49-F238E27FC236}">
+                <a16:creationId xmlns:a16="http://schemas.microsoft.com/office/drawing/2014/main" id="{8DDE90FF-2BF1-A31A-4507-58CEA9BA01F2}"/>
+              </a:ext>
+            </a:extLst>
+          </p:cNvPr>
+          <p:cNvCxnSpPr/>
+          <p:nvPr/>
+        </p:nvCxnSpPr>
+        <p:spPr>
+          <a:xfrm flipH="1" flipV="1">
+            <a:off x="4192621" y="2175753"/>
+            <a:ext cx="1027888" cy="751936"/>
+          </a:xfrm>
+          <a:prstGeom prst="straightConnector1">
+            <a:avLst/>
+          </a:prstGeom>
+          <a:ln>
+            <a:solidFill>
+              <a:schemeClr val="bg2"/>
+            </a:solidFill>
+            <a:tailEnd type="triangle"/>
+          </a:ln>
+        </p:spPr>
+        <p:style>
+          <a:lnRef idx="1">
+            <a:schemeClr val="accent1"/>
+          </a:lnRef>
+          <a:fillRef idx="0">
+            <a:schemeClr val="accent1"/>
+          </a:fillRef>
+          <a:effectRef idx="0">
+            <a:schemeClr val="accent1"/>
+          </a:effectRef>
+          <a:fontRef idx="minor">
+            <a:schemeClr val="tx1"/>
+          </a:fontRef>
+        </p:style>
+      </p:cxnSp>
+      <p:cxnSp>
+        <p:nvCxnSpPr>
+          <p:cNvPr id="28" name="Straight Arrow Connector 27">
+            <a:extLst>
+              <a:ext uri="{FF2B5EF4-FFF2-40B4-BE49-F238E27FC236}">
+                <a16:creationId xmlns:a16="http://schemas.microsoft.com/office/drawing/2014/main" id="{1E9260F8-AA15-DDE1-BBA2-CFBA44C934A1}"/>
+              </a:ext>
+            </a:extLst>
+          </p:cNvPr>
+          <p:cNvCxnSpPr/>
+          <p:nvPr/>
+        </p:nvCxnSpPr>
+        <p:spPr>
+          <a:xfrm flipV="1">
+            <a:off x="7007967" y="2175753"/>
+            <a:ext cx="1064367" cy="830094"/>
+          </a:xfrm>
+          <a:prstGeom prst="straightConnector1">
+            <a:avLst/>
+          </a:prstGeom>
+          <a:ln>
+            <a:solidFill>
+              <a:schemeClr val="bg1"/>
+            </a:solidFill>
+            <a:tailEnd type="triangle"/>
+          </a:ln>
+        </p:spPr>
+        <p:style>
+          <a:lnRef idx="1">
+            <a:schemeClr val="accent1"/>
+          </a:lnRef>
+          <a:fillRef idx="0">
+            <a:schemeClr val="accent1"/>
+          </a:fillRef>
+          <a:effectRef idx="0">
+            <a:schemeClr val="accent1"/>
+          </a:effectRef>
+          <a:fontRef idx="minor">
+            <a:schemeClr val="tx1"/>
+          </a:fontRef>
+        </p:style>
+      </p:cxnSp>
+      <p:cxnSp>
+        <p:nvCxnSpPr>
+          <p:cNvPr id="30" name="Straight Arrow Connector 29">
+            <a:extLst>
+              <a:ext uri="{FF2B5EF4-FFF2-40B4-BE49-F238E27FC236}">
+                <a16:creationId xmlns:a16="http://schemas.microsoft.com/office/drawing/2014/main" id="{BF78F3B3-450A-4E4D-E401-C15F403AA1C7}"/>
+              </a:ext>
+            </a:extLst>
+          </p:cNvPr>
+          <p:cNvCxnSpPr/>
+          <p:nvPr/>
+        </p:nvCxnSpPr>
+        <p:spPr>
+          <a:xfrm flipH="1">
+            <a:off x="4149253" y="3871104"/>
+            <a:ext cx="1048153" cy="896733"/>
+          </a:xfrm>
+          <a:prstGeom prst="straightConnector1">
+            <a:avLst/>
+          </a:prstGeom>
+          <a:ln>
+            <a:solidFill>
+              <a:schemeClr val="bg1"/>
+            </a:solidFill>
+            <a:tailEnd type="triangle"/>
+          </a:ln>
+        </p:spPr>
+        <p:style>
+          <a:lnRef idx="1">
+            <a:schemeClr val="accent1"/>
+          </a:lnRef>
+          <a:fillRef idx="0">
+            <a:schemeClr val="accent1"/>
+          </a:fillRef>
+          <a:effectRef idx="0">
+            <a:schemeClr val="accent1"/>
+          </a:effectRef>
+          <a:fontRef idx="minor">
+            <a:schemeClr val="tx1"/>
+          </a:fontRef>
+        </p:style>
+      </p:cxnSp>
+      <p:cxnSp>
+        <p:nvCxnSpPr>
+          <p:cNvPr id="32" name="Straight Arrow Connector 31">
+            <a:extLst>
+              <a:ext uri="{FF2B5EF4-FFF2-40B4-BE49-F238E27FC236}">
+                <a16:creationId xmlns:a16="http://schemas.microsoft.com/office/drawing/2014/main" id="{49ABB7E7-E970-C803-AF05-657134F9D037}"/>
+              </a:ext>
+            </a:extLst>
+          </p:cNvPr>
+          <p:cNvCxnSpPr/>
+          <p:nvPr/>
+        </p:nvCxnSpPr>
+        <p:spPr>
+          <a:xfrm>
+            <a:off x="7007967" y="3837784"/>
+            <a:ext cx="1153135" cy="844463"/>
+          </a:xfrm>
+          <a:prstGeom prst="straightConnector1">
+            <a:avLst/>
+          </a:prstGeom>
+          <a:ln>
+            <a:solidFill>
+              <a:schemeClr val="bg1"/>
+            </a:solidFill>
+            <a:tailEnd type="triangle"/>
+          </a:ln>
+        </p:spPr>
+        <p:style>
+          <a:lnRef idx="1">
+            <a:schemeClr val="accent1"/>
+          </a:lnRef>
+          <a:fillRef idx="0">
+            <a:schemeClr val="accent1"/>
+          </a:fillRef>
+          <a:effectRef idx="0">
+            <a:schemeClr val="accent1"/>
+          </a:effectRef>
+          <a:fontRef idx="minor">
+            <a:schemeClr val="tx1"/>
+          </a:fontRef>
+        </p:style>
+      </p:cxnSp>
+      <p:pic>
+        <p:nvPicPr>
+          <p:cNvPr id="34" name="Picture 33">
+            <a:extLst>
+              <a:ext uri="{FF2B5EF4-FFF2-40B4-BE49-F238E27FC236}">
+                <a16:creationId xmlns:a16="http://schemas.microsoft.com/office/drawing/2014/main" id="{4D2BBBD6-BADB-AB03-DC15-C5FB5CAEE347}"/>
+              </a:ext>
+            </a:extLst>
+          </p:cNvPr>
+          <p:cNvPicPr>
+            <a:picLocks noChangeAspect="1"/>
+          </p:cNvPicPr>
+          <p:nvPr/>
+        </p:nvPicPr>
+        <p:blipFill>
+          <a:blip r:embed="rId2">
+            <a:extLst>
+              <a:ext uri="{28A0092B-C50C-407E-A947-70E740481C1C}">
+                <a14:useLocalDpi xmlns:a14="http://schemas.microsoft.com/office/drawing/2010/main" val="0"/>
+              </a:ext>
+              <a:ext uri="{837473B0-CC2E-450A-ABE3-18F120FF3D39}">
+                <a1611:picAttrSrcUrl xmlns:a1611="http://schemas.microsoft.com/office/drawing/2016/11/main" r:id="rId3"/>
+              </a:ext>
+            </a:extLst>
+          </a:blip>
+          <a:stretch>
+            <a:fillRect/>
+          </a:stretch>
+        </p:blipFill>
+        <p:spPr>
+          <a:xfrm>
+            <a:off x="117544" y="147537"/>
+            <a:ext cx="1575070" cy="1690992"/>
+          </a:xfrm>
+          <a:prstGeom prst="rect">
+            <a:avLst/>
+          </a:prstGeom>
+        </p:spPr>
+      </p:pic>
+      <p:pic>
+        <p:nvPicPr>
+          <p:cNvPr id="36" name="Picture 35">
+            <a:extLst>
+              <a:ext uri="{FF2B5EF4-FFF2-40B4-BE49-F238E27FC236}">
+                <a16:creationId xmlns:a16="http://schemas.microsoft.com/office/drawing/2014/main" id="{002341F8-2C7C-DE97-27C7-F9A18D5E541D}"/>
+              </a:ext>
+            </a:extLst>
+          </p:cNvPr>
+          <p:cNvPicPr>
+            <a:picLocks noChangeAspect="1"/>
+          </p:cNvPicPr>
+          <p:nvPr/>
+        </p:nvPicPr>
+        <p:blipFill>
+          <a:blip r:embed="rId4">
+            <a:extLst>
+              <a:ext uri="{28A0092B-C50C-407E-A947-70E740481C1C}">
+                <a14:useLocalDpi xmlns:a14="http://schemas.microsoft.com/office/drawing/2010/main" val="0"/>
+              </a:ext>
+              <a:ext uri="{837473B0-CC2E-450A-ABE3-18F120FF3D39}">
+                <a1611:picAttrSrcUrl xmlns:a1611="http://schemas.microsoft.com/office/drawing/2016/11/main" r:id="rId5"/>
+              </a:ext>
+            </a:extLst>
+          </a:blip>
+          <a:stretch>
+            <a:fillRect/>
+          </a:stretch>
+        </p:blipFill>
+        <p:spPr>
+          <a:xfrm>
+            <a:off x="10499386" y="284062"/>
+            <a:ext cx="1419428" cy="1449422"/>
+          </a:xfrm>
+          <a:prstGeom prst="rect">
+            <a:avLst/>
+          </a:prstGeom>
+        </p:spPr>
+      </p:pic>
+    </p:spTree>
+    <p:extLst>
+      <p:ext uri="{BB962C8B-B14F-4D97-AF65-F5344CB8AC3E}">
+        <p14:creationId xmlns:p14="http://schemas.microsoft.com/office/powerpoint/2010/main" val="4076268974"/>
+      </p:ext>
+    </p:extLst>
+  </p:cSld>
+  <p:clrMapOvr>
+    <a:masterClrMapping/>
+  </p:clrMapOvr>
+  <mc:AlternateContent xmlns:mc="http://schemas.openxmlformats.org/markup-compatibility/2006">
+    <mc:Choice xmlns:p15="http://schemas.microsoft.com/office/powerpoint/2012/main" Requires="p15">
+      <p:transition xmlns:p14="http://schemas.microsoft.com/office/powerpoint/2010/main" spd="slow" p14:dur="2000">
+        <p15:prstTrans prst="fracture"/>
+      </p:transition>
+    </mc:Choice>
+    <mc:Fallback>
+      <p:transition spd="slow">
+        <p:fade/>
+      </p:transition>
+    </mc:Fallback>
+  </mc:AlternateContent>
+  <p:timing>
+    <p:tnLst>
+      <p:par>
+        <p:cTn id="1" dur="indefinite" restart="never" nodeType="tmRoot">
+          <p:childTnLst>
+            <p:seq concurrent="1" nextAc="seek">
+              <p:cTn id="2" dur="indefinite" nodeType="mainSeq">
+                <p:childTnLst>
+                  <p:par>
+                    <p:cTn id="3" fill="hold">
+                      <p:stCondLst>
+                        <p:cond delay="indefinite"/>
+                      </p:stCondLst>
+                      <p:childTnLst>
+                        <p:par>
+                          <p:cTn id="4" fill="hold">
+                            <p:stCondLst>
+                              <p:cond delay="0"/>
+                            </p:stCondLst>
+                            <p:childTnLst>
+                              <p:par>
+                                <p:cTn id="5" presetID="53" presetClass="entr" presetSubtype="16" fill="hold" grpId="0" nodeType="clickEffect">
+                                  <p:stCondLst>
+                                    <p:cond delay="0"/>
+                                  </p:stCondLst>
+                                  <p:childTnLst>
+                                    <p:set>
+                                      <p:cBhvr>
+                                        <p:cTn id="6" dur="1" fill="hold">
+                                          <p:stCondLst>
+                                            <p:cond delay="0"/>
+                                          </p:stCondLst>
+                                        </p:cTn>
+                                        <p:tgtEl>
+                                          <p:spTgt spid="4"/>
+                                        </p:tgtEl>
+                                        <p:attrNameLst>
+                                          <p:attrName>style.visibility</p:attrName>
+                                        </p:attrNameLst>
+                                      </p:cBhvr>
+                                      <p:to>
+                                        <p:strVal val="visible"/>
+                                      </p:to>
+                                    </p:set>
+                                    <p:anim calcmode="lin" valueType="num">
+                                      <p:cBhvr>
+                                        <p:cTn id="7" dur="500" fill="hold"/>
+                                        <p:tgtEl>
+                                          <p:spTgt spid="4"/>
+                                        </p:tgtEl>
+                                        <p:attrNameLst>
+                                          <p:attrName>ppt_w</p:attrName>
+                                        </p:attrNameLst>
+                                      </p:cBhvr>
+                                      <p:tavLst>
+                                        <p:tav tm="0">
+                                          <p:val>
+                                            <p:fltVal val="0"/>
+                                          </p:val>
+                                        </p:tav>
+                                        <p:tav tm="100000">
+                                          <p:val>
+                                            <p:strVal val="#ppt_w"/>
+                                          </p:val>
+                                        </p:tav>
+                                      </p:tavLst>
+                                    </p:anim>
+                                    <p:anim calcmode="lin" valueType="num">
+                                      <p:cBhvr>
+                                        <p:cTn id="8" dur="500" fill="hold"/>
+                                        <p:tgtEl>
+                                          <p:spTgt spid="4"/>
+                                        </p:tgtEl>
+                                        <p:attrNameLst>
+                                          <p:attrName>ppt_h</p:attrName>
+                                        </p:attrNameLst>
+                                      </p:cBhvr>
+                                      <p:tavLst>
+                                        <p:tav tm="0">
+                                          <p:val>
+                                            <p:fltVal val="0"/>
+                                          </p:val>
+                                        </p:tav>
+                                        <p:tav tm="100000">
+                                          <p:val>
+                                            <p:strVal val="#ppt_h"/>
+                                          </p:val>
+                                        </p:tav>
+                                      </p:tavLst>
+                                    </p:anim>
+                                    <p:animEffect transition="in" filter="fade">
+                                      <p:cBhvr>
+                                        <p:cTn id="9" dur="500"/>
+                                        <p:tgtEl>
+                                          <p:spTgt spid="4"/>
+                                        </p:tgtEl>
+                                      </p:cBhvr>
+                                    </p:animEffect>
+                                  </p:childTnLst>
+                                </p:cTn>
+                              </p:par>
+                            </p:childTnLst>
+                          </p:cTn>
+                        </p:par>
+                        <p:par>
+                          <p:cTn id="10" fill="hold">
+                            <p:stCondLst>
+                              <p:cond delay="500"/>
+                            </p:stCondLst>
+                            <p:childTnLst>
+                              <p:par>
+                                <p:cTn id="11" presetID="53" presetClass="entr" presetSubtype="16" fill="hold" grpId="0" nodeType="afterEffect">
+                                  <p:stCondLst>
+                                    <p:cond delay="0"/>
+                                  </p:stCondLst>
+                                  <p:childTnLst>
+                                    <p:set>
+                                      <p:cBhvr>
+                                        <p:cTn id="12" dur="1" fill="hold">
+                                          <p:stCondLst>
+                                            <p:cond delay="0"/>
+                                          </p:stCondLst>
+                                        </p:cTn>
+                                        <p:tgtEl>
+                                          <p:spTgt spid="5"/>
+                                        </p:tgtEl>
+                                        <p:attrNameLst>
+                                          <p:attrName>style.visibility</p:attrName>
+                                        </p:attrNameLst>
+                                      </p:cBhvr>
+                                      <p:to>
+                                        <p:strVal val="visible"/>
+                                      </p:to>
+                                    </p:set>
+                                    <p:anim calcmode="lin" valueType="num">
+                                      <p:cBhvr>
+                                        <p:cTn id="13" dur="500" fill="hold"/>
+                                        <p:tgtEl>
+                                          <p:spTgt spid="5"/>
+                                        </p:tgtEl>
+                                        <p:attrNameLst>
+                                          <p:attrName>ppt_w</p:attrName>
+                                        </p:attrNameLst>
+                                      </p:cBhvr>
+                                      <p:tavLst>
+                                        <p:tav tm="0">
+                                          <p:val>
+                                            <p:fltVal val="0"/>
+                                          </p:val>
+                                        </p:tav>
+                                        <p:tav tm="100000">
+                                          <p:val>
+                                            <p:strVal val="#ppt_w"/>
+                                          </p:val>
+                                        </p:tav>
+                                      </p:tavLst>
+                                    </p:anim>
+                                    <p:anim calcmode="lin" valueType="num">
+                                      <p:cBhvr>
+                                        <p:cTn id="14" dur="500" fill="hold"/>
+                                        <p:tgtEl>
+                                          <p:spTgt spid="5"/>
+                                        </p:tgtEl>
+                                        <p:attrNameLst>
+                                          <p:attrName>ppt_h</p:attrName>
+                                        </p:attrNameLst>
+                                      </p:cBhvr>
+                                      <p:tavLst>
+                                        <p:tav tm="0">
+                                          <p:val>
+                                            <p:fltVal val="0"/>
+                                          </p:val>
+                                        </p:tav>
+                                        <p:tav tm="100000">
+                                          <p:val>
+                                            <p:strVal val="#ppt_h"/>
+                                          </p:val>
+                                        </p:tav>
+                                      </p:tavLst>
+                                    </p:anim>
+                                    <p:animEffect transition="in" filter="fade">
+                                      <p:cBhvr>
+                                        <p:cTn id="15" dur="500"/>
+                                        <p:tgtEl>
+                                          <p:spTgt spid="5"/>
+                                        </p:tgtEl>
+                                      </p:cBhvr>
+                                    </p:animEffect>
+                                  </p:childTnLst>
+                                </p:cTn>
+                              </p:par>
+                            </p:childTnLst>
+                          </p:cTn>
+                        </p:par>
+                        <p:par>
+                          <p:cTn id="16" fill="hold">
+                            <p:stCondLst>
+                              <p:cond delay="1000"/>
+                            </p:stCondLst>
+                            <p:childTnLst>
+                              <p:par>
+                                <p:cTn id="17" presetID="53" presetClass="entr" presetSubtype="16" fill="hold" grpId="0" nodeType="afterEffect">
+                                  <p:stCondLst>
+                                    <p:cond delay="0"/>
+                                  </p:stCondLst>
+                                  <p:childTnLst>
+                                    <p:set>
+                                      <p:cBhvr>
+                                        <p:cTn id="18" dur="1" fill="hold">
+                                          <p:stCondLst>
+                                            <p:cond delay="0"/>
+                                          </p:stCondLst>
+                                        </p:cTn>
+                                        <p:tgtEl>
+                                          <p:spTgt spid="7"/>
+                                        </p:tgtEl>
+                                        <p:attrNameLst>
+                                          <p:attrName>style.visibility</p:attrName>
+                                        </p:attrNameLst>
+                                      </p:cBhvr>
+                                      <p:to>
+                                        <p:strVal val="visible"/>
+                                      </p:to>
+                                    </p:set>
+                                    <p:anim calcmode="lin" valueType="num">
+                                      <p:cBhvr>
+                                        <p:cTn id="19" dur="500" fill="hold"/>
+                                        <p:tgtEl>
+                                          <p:spTgt spid="7"/>
+                                        </p:tgtEl>
+                                        <p:attrNameLst>
+                                          <p:attrName>ppt_w</p:attrName>
+                                        </p:attrNameLst>
+                                      </p:cBhvr>
+                                      <p:tavLst>
+                                        <p:tav tm="0">
+                                          <p:val>
+                                            <p:fltVal val="0"/>
+                                          </p:val>
+                                        </p:tav>
+                                        <p:tav tm="100000">
+                                          <p:val>
+                                            <p:strVal val="#ppt_w"/>
+                                          </p:val>
+                                        </p:tav>
+                                      </p:tavLst>
+                                    </p:anim>
+                                    <p:anim calcmode="lin" valueType="num">
+                                      <p:cBhvr>
+                                        <p:cTn id="20" dur="500" fill="hold"/>
+                                        <p:tgtEl>
+                                          <p:spTgt spid="7"/>
+                                        </p:tgtEl>
+                                        <p:attrNameLst>
+                                          <p:attrName>ppt_h</p:attrName>
+                                        </p:attrNameLst>
+                                      </p:cBhvr>
+                                      <p:tavLst>
+                                        <p:tav tm="0">
+                                          <p:val>
+                                            <p:fltVal val="0"/>
+                                          </p:val>
+                                        </p:tav>
+                                        <p:tav tm="100000">
+                                          <p:val>
+                                            <p:strVal val="#ppt_h"/>
+                                          </p:val>
+                                        </p:tav>
+                                      </p:tavLst>
+                                    </p:anim>
+                                    <p:animEffect transition="in" filter="fade">
+                                      <p:cBhvr>
+                                        <p:cTn id="21" dur="500"/>
+                                        <p:tgtEl>
+                                          <p:spTgt spid="7"/>
+                                        </p:tgtEl>
+                                      </p:cBhvr>
+                                    </p:animEffect>
+                                  </p:childTnLst>
+                                </p:cTn>
+                              </p:par>
+                            </p:childTnLst>
+                          </p:cTn>
+                        </p:par>
+                        <p:par>
+                          <p:cTn id="22" fill="hold">
+                            <p:stCondLst>
+                              <p:cond delay="1500"/>
+                            </p:stCondLst>
+                            <p:childTnLst>
+                              <p:par>
+                                <p:cTn id="23" presetID="53" presetClass="entr" presetSubtype="16" fill="hold" grpId="0" nodeType="afterEffect">
+                                  <p:stCondLst>
+                                    <p:cond delay="0"/>
+                                  </p:stCondLst>
+                                  <p:childTnLst>
+                                    <p:set>
+                                      <p:cBhvr>
+                                        <p:cTn id="24" dur="1" fill="hold">
+                                          <p:stCondLst>
+                                            <p:cond delay="0"/>
+                                          </p:stCondLst>
+                                        </p:cTn>
+                                        <p:tgtEl>
+                                          <p:spTgt spid="8"/>
+                                        </p:tgtEl>
+                                        <p:attrNameLst>
+                                          <p:attrName>style.visibility</p:attrName>
+                                        </p:attrNameLst>
+                                      </p:cBhvr>
+                                      <p:to>
+                                        <p:strVal val="visible"/>
+                                      </p:to>
+                                    </p:set>
+                                    <p:anim calcmode="lin" valueType="num">
+                                      <p:cBhvr>
+                                        <p:cTn id="25" dur="500" fill="hold"/>
+                                        <p:tgtEl>
+                                          <p:spTgt spid="8"/>
+                                        </p:tgtEl>
+                                        <p:attrNameLst>
+                                          <p:attrName>ppt_w</p:attrName>
+                                        </p:attrNameLst>
+                                      </p:cBhvr>
+                                      <p:tavLst>
+                                        <p:tav tm="0">
+                                          <p:val>
+                                            <p:fltVal val="0"/>
+                                          </p:val>
+                                        </p:tav>
+                                        <p:tav tm="100000">
+                                          <p:val>
+                                            <p:strVal val="#ppt_w"/>
+                                          </p:val>
+                                        </p:tav>
+                                      </p:tavLst>
+                                    </p:anim>
+                                    <p:anim calcmode="lin" valueType="num">
+                                      <p:cBhvr>
+                                        <p:cTn id="26" dur="500" fill="hold"/>
+                                        <p:tgtEl>
+                                          <p:spTgt spid="8"/>
+                                        </p:tgtEl>
+                                        <p:attrNameLst>
+                                          <p:attrName>ppt_h</p:attrName>
+                                        </p:attrNameLst>
+                                      </p:cBhvr>
+                                      <p:tavLst>
+                                        <p:tav tm="0">
+                                          <p:val>
+                                            <p:fltVal val="0"/>
+                                          </p:val>
+                                        </p:tav>
+                                        <p:tav tm="100000">
+                                          <p:val>
+                                            <p:strVal val="#ppt_h"/>
+                                          </p:val>
+                                        </p:tav>
+                                      </p:tavLst>
+                                    </p:anim>
+                                    <p:animEffect transition="in" filter="fade">
+                                      <p:cBhvr>
+                                        <p:cTn id="27" dur="500"/>
+                                        <p:tgtEl>
+                                          <p:spTgt spid="8"/>
+                                        </p:tgtEl>
+                                      </p:cBhvr>
+                                    </p:animEffect>
+                                  </p:childTnLst>
+                                </p:cTn>
+                              </p:par>
+                            </p:childTnLst>
+                          </p:cTn>
+                        </p:par>
+                        <p:par>
+                          <p:cTn id="28" fill="hold">
+                            <p:stCondLst>
+                              <p:cond delay="2000"/>
+                            </p:stCondLst>
+                            <p:childTnLst>
+                              <p:par>
+                                <p:cTn id="29" presetID="53" presetClass="entr" presetSubtype="16" fill="hold" grpId="0" nodeType="afterEffect">
+                                  <p:stCondLst>
+                                    <p:cond delay="0"/>
+                                  </p:stCondLst>
+                                  <p:childTnLst>
+                                    <p:set>
+                                      <p:cBhvr>
+                                        <p:cTn id="30" dur="1" fill="hold">
+                                          <p:stCondLst>
+                                            <p:cond delay="0"/>
+                                          </p:stCondLst>
+                                        </p:cTn>
+                                        <p:tgtEl>
+                                          <p:spTgt spid="11"/>
+                                        </p:tgtEl>
+                                        <p:attrNameLst>
+                                          <p:attrName>style.visibility</p:attrName>
+                                        </p:attrNameLst>
+                                      </p:cBhvr>
+                                      <p:to>
+                                        <p:strVal val="visible"/>
+                                      </p:to>
+                                    </p:set>
+                                    <p:anim calcmode="lin" valueType="num">
+                                      <p:cBhvr>
+                                        <p:cTn id="31" dur="500" fill="hold"/>
+                                        <p:tgtEl>
+                                          <p:spTgt spid="11"/>
+                                        </p:tgtEl>
+                                        <p:attrNameLst>
+                                          <p:attrName>ppt_w</p:attrName>
+                                        </p:attrNameLst>
+                                      </p:cBhvr>
+                                      <p:tavLst>
+                                        <p:tav tm="0">
+                                          <p:val>
+                                            <p:fltVal val="0"/>
+                                          </p:val>
+                                        </p:tav>
+                                        <p:tav tm="100000">
+                                          <p:val>
+                                            <p:strVal val="#ppt_w"/>
+                                          </p:val>
+                                        </p:tav>
+                                      </p:tavLst>
+                                    </p:anim>
+                                    <p:anim calcmode="lin" valueType="num">
+                                      <p:cBhvr>
+                                        <p:cTn id="32" dur="500" fill="hold"/>
+                                        <p:tgtEl>
+                                          <p:spTgt spid="11"/>
+                                        </p:tgtEl>
+                                        <p:attrNameLst>
+                                          <p:attrName>ppt_h</p:attrName>
+                                        </p:attrNameLst>
+                                      </p:cBhvr>
+                                      <p:tavLst>
+                                        <p:tav tm="0">
+                                          <p:val>
+                                            <p:fltVal val="0"/>
+                                          </p:val>
+                                        </p:tav>
+                                        <p:tav tm="100000">
+                                          <p:val>
+                                            <p:strVal val="#ppt_h"/>
+                                          </p:val>
+                                        </p:tav>
+                                      </p:tavLst>
+                                    </p:anim>
+                                    <p:animEffect transition="in" filter="fade">
+                                      <p:cBhvr>
+                                        <p:cTn id="33" dur="500"/>
+                                        <p:tgtEl>
+                                          <p:spTgt spid="11"/>
+                                        </p:tgtEl>
+                                      </p:cBhvr>
+                                    </p:animEffect>
+                                  </p:childTnLst>
+                                </p:cTn>
+                              </p:par>
+                            </p:childTnLst>
+                          </p:cTn>
+                        </p:par>
+                        <p:par>
+                          <p:cTn id="34" fill="hold">
+                            <p:stCondLst>
+                              <p:cond delay="2500"/>
+                            </p:stCondLst>
+                            <p:childTnLst>
+                              <p:par>
+                                <p:cTn id="35" presetID="53" presetClass="entr" presetSubtype="16" fill="hold" grpId="0" nodeType="afterEffect">
+                                  <p:stCondLst>
+                                    <p:cond delay="0"/>
+                                  </p:stCondLst>
+                                  <p:childTnLst>
+                                    <p:set>
+                                      <p:cBhvr>
+                                        <p:cTn id="36" dur="1" fill="hold">
+                                          <p:stCondLst>
+                                            <p:cond delay="0"/>
+                                          </p:stCondLst>
+                                        </p:cTn>
+                                        <p:tgtEl>
+                                          <p:spTgt spid="10"/>
+                                        </p:tgtEl>
+                                        <p:attrNameLst>
+                                          <p:attrName>style.visibility</p:attrName>
+                                        </p:attrNameLst>
+                                      </p:cBhvr>
+                                      <p:to>
+                                        <p:strVal val="visible"/>
+                                      </p:to>
+                                    </p:set>
+                                    <p:anim calcmode="lin" valueType="num">
+                                      <p:cBhvr>
+                                        <p:cTn id="37" dur="500" fill="hold"/>
+                                        <p:tgtEl>
+                                          <p:spTgt spid="10"/>
+                                        </p:tgtEl>
+                                        <p:attrNameLst>
+                                          <p:attrName>ppt_w</p:attrName>
+                                        </p:attrNameLst>
+                                      </p:cBhvr>
+                                      <p:tavLst>
+                                        <p:tav tm="0">
+                                          <p:val>
+                                            <p:fltVal val="0"/>
+                                          </p:val>
+                                        </p:tav>
+                                        <p:tav tm="100000">
+                                          <p:val>
+                                            <p:strVal val="#ppt_w"/>
+                                          </p:val>
+                                        </p:tav>
+                                      </p:tavLst>
+                                    </p:anim>
+                                    <p:anim calcmode="lin" valueType="num">
+                                      <p:cBhvr>
+                                        <p:cTn id="38" dur="500" fill="hold"/>
+                                        <p:tgtEl>
+                                          <p:spTgt spid="10"/>
+                                        </p:tgtEl>
+                                        <p:attrNameLst>
+                                          <p:attrName>ppt_h</p:attrName>
+                                        </p:attrNameLst>
+                                      </p:cBhvr>
+                                      <p:tavLst>
+                                        <p:tav tm="0">
+                                          <p:val>
+                                            <p:fltVal val="0"/>
+                                          </p:val>
+                                        </p:tav>
+                                        <p:tav tm="100000">
+                                          <p:val>
+                                            <p:strVal val="#ppt_h"/>
+                                          </p:val>
+                                        </p:tav>
+                                      </p:tavLst>
+                                    </p:anim>
+                                    <p:animEffect transition="in" filter="fade">
+                                      <p:cBhvr>
+                                        <p:cTn id="39" dur="500"/>
+                                        <p:tgtEl>
+                                          <p:spTgt spid="10"/>
+                                        </p:tgtEl>
+                                      </p:cBhvr>
+                                    </p:animEffect>
+                                  </p:childTnLst>
+                                </p:cTn>
+                              </p:par>
+                            </p:childTnLst>
+                          </p:cTn>
+                        </p:par>
+                        <p:par>
+                          <p:cTn id="40" fill="hold">
+                            <p:stCondLst>
+                              <p:cond delay="3000"/>
+                            </p:stCondLst>
+                            <p:childTnLst>
+                              <p:par>
+                                <p:cTn id="41" presetID="53" presetClass="entr" presetSubtype="16" fill="hold" grpId="0" nodeType="afterEffect">
+                                  <p:stCondLst>
+                                    <p:cond delay="0"/>
+                                  </p:stCondLst>
+                                  <p:childTnLst>
+                                    <p:set>
+                                      <p:cBhvr>
+                                        <p:cTn id="42" dur="1" fill="hold">
+                                          <p:stCondLst>
+                                            <p:cond delay="0"/>
+                                          </p:stCondLst>
+                                        </p:cTn>
+                                        <p:tgtEl>
+                                          <p:spTgt spid="9"/>
+                                        </p:tgtEl>
+                                        <p:attrNameLst>
+                                          <p:attrName>style.visibility</p:attrName>
+                                        </p:attrNameLst>
+                                      </p:cBhvr>
+                                      <p:to>
+                                        <p:strVal val="visible"/>
+                                      </p:to>
+                                    </p:set>
+                                    <p:anim calcmode="lin" valueType="num">
+                                      <p:cBhvr>
+                                        <p:cTn id="43" dur="500" fill="hold"/>
+                                        <p:tgtEl>
+                                          <p:spTgt spid="9"/>
+                                        </p:tgtEl>
+                                        <p:attrNameLst>
+                                          <p:attrName>ppt_w</p:attrName>
+                                        </p:attrNameLst>
+                                      </p:cBhvr>
+                                      <p:tavLst>
+                                        <p:tav tm="0">
+                                          <p:val>
+                                            <p:fltVal val="0"/>
+                                          </p:val>
+                                        </p:tav>
+                                        <p:tav tm="100000">
+                                          <p:val>
+                                            <p:strVal val="#ppt_w"/>
+                                          </p:val>
+                                        </p:tav>
+                                      </p:tavLst>
+                                    </p:anim>
+                                    <p:anim calcmode="lin" valueType="num">
+                                      <p:cBhvr>
+                                        <p:cTn id="44" dur="500" fill="hold"/>
+                                        <p:tgtEl>
+                                          <p:spTgt spid="9"/>
+                                        </p:tgtEl>
+                                        <p:attrNameLst>
+                                          <p:attrName>ppt_h</p:attrName>
+                                        </p:attrNameLst>
+                                      </p:cBhvr>
+                                      <p:tavLst>
+                                        <p:tav tm="0">
+                                          <p:val>
+                                            <p:fltVal val="0"/>
+                                          </p:val>
+                                        </p:tav>
+                                        <p:tav tm="100000">
+                                          <p:val>
+                                            <p:strVal val="#ppt_h"/>
+                                          </p:val>
+                                        </p:tav>
+                                      </p:tavLst>
+                                    </p:anim>
+                                    <p:animEffect transition="in" filter="fade">
+                                      <p:cBhvr>
+                                        <p:cTn id="45" dur="500"/>
+                                        <p:tgtEl>
+                                          <p:spTgt spid="9"/>
+                                        </p:tgtEl>
+                                      </p:cBhvr>
+                                    </p:animEffect>
+                                  </p:childTnLst>
+                                </p:cTn>
+                              </p:par>
+                            </p:childTnLst>
+                          </p:cTn>
+                        </p:par>
+                        <p:par>
+                          <p:cTn id="46" fill="hold">
+                            <p:stCondLst>
+                              <p:cond delay="3500"/>
+                            </p:stCondLst>
+                            <p:childTnLst>
+                              <p:par>
+                                <p:cTn id="47" presetID="53" presetClass="entr" presetSubtype="16" fill="hold" grpId="0" nodeType="afterEffect">
+                                  <p:stCondLst>
+                                    <p:cond delay="0"/>
+                                  </p:stCondLst>
+                                  <p:childTnLst>
+                                    <p:set>
+                                      <p:cBhvr>
+                                        <p:cTn id="48" dur="1" fill="hold">
+                                          <p:stCondLst>
+                                            <p:cond delay="0"/>
+                                          </p:stCondLst>
+                                        </p:cTn>
+                                        <p:tgtEl>
+                                          <p:spTgt spid="6"/>
+                                        </p:tgtEl>
+                                        <p:attrNameLst>
+                                          <p:attrName>style.visibility</p:attrName>
+                                        </p:attrNameLst>
+                                      </p:cBhvr>
+                                      <p:to>
+                                        <p:strVal val="visible"/>
+                                      </p:to>
+                                    </p:set>
+                                    <p:anim calcmode="lin" valueType="num">
+                                      <p:cBhvr>
+                                        <p:cTn id="49" dur="500" fill="hold"/>
+                                        <p:tgtEl>
+                                          <p:spTgt spid="6"/>
+                                        </p:tgtEl>
+                                        <p:attrNameLst>
+                                          <p:attrName>ppt_w</p:attrName>
+                                        </p:attrNameLst>
+                                      </p:cBhvr>
+                                      <p:tavLst>
+                                        <p:tav tm="0">
+                                          <p:val>
+                                            <p:fltVal val="0"/>
+                                          </p:val>
+                                        </p:tav>
+                                        <p:tav tm="100000">
+                                          <p:val>
+                                            <p:strVal val="#ppt_w"/>
+                                          </p:val>
+                                        </p:tav>
+                                      </p:tavLst>
+                                    </p:anim>
+                                    <p:anim calcmode="lin" valueType="num">
+                                      <p:cBhvr>
+                                        <p:cTn id="50" dur="500" fill="hold"/>
+                                        <p:tgtEl>
+                                          <p:spTgt spid="6"/>
+                                        </p:tgtEl>
+                                        <p:attrNameLst>
+                                          <p:attrName>ppt_h</p:attrName>
+                                        </p:attrNameLst>
+                                      </p:cBhvr>
+                                      <p:tavLst>
+                                        <p:tav tm="0">
+                                          <p:val>
+                                            <p:fltVal val="0"/>
+                                          </p:val>
+                                        </p:tav>
+                                        <p:tav tm="100000">
+                                          <p:val>
+                                            <p:strVal val="#ppt_h"/>
+                                          </p:val>
+                                        </p:tav>
+                                      </p:tavLst>
+                                    </p:anim>
+                                    <p:animEffect transition="in" filter="fade">
+                                      <p:cBhvr>
+                                        <p:cTn id="51" dur="500"/>
+                                        <p:tgtEl>
+                                          <p:spTgt spid="6"/>
+                                        </p:tgtEl>
+                                      </p:cBhvr>
+                                    </p:animEffect>
+                                  </p:childTnLst>
+                                </p:cTn>
+                              </p:par>
+                            </p:childTnLst>
+                          </p:cTn>
+                        </p:par>
+                      </p:childTnLst>
+                    </p:cTn>
+                  </p:par>
+                </p:childTnLst>
+              </p:cTn>
+              <p:prevCondLst>
+                <p:cond evt="onPrev" delay="0">
+                  <p:tgtEl>
+                    <p:sldTgt/>
+                  </p:tgtEl>
+                </p:cond>
+              </p:prevCondLst>
+              <p:nextCondLst>
+                <p:cond evt="onNext" delay="0">
+                  <p:tgtEl>
+                    <p:sldTgt/>
+                  </p:tgtEl>
+                </p:cond>
+              </p:nextCondLst>
+            </p:seq>
+          </p:childTnLst>
+        </p:cTn>
+      </p:par>
+    </p:tnLst>
+    <p:bldLst>
+      <p:bldP spid="4" grpId="0" animBg="1"/>
+      <p:bldP spid="5" grpId="0" animBg="1"/>
+      <p:bldP spid="6" grpId="0" animBg="1"/>
+      <p:bldP spid="7" grpId="0" animBg="1"/>
+      <p:bldP spid="8" grpId="0" animBg="1"/>
+      <p:bldP spid="9" grpId="0" animBg="1"/>
+      <p:bldP spid="10" grpId="0" animBg="1"/>
+      <p:bldP spid="11" grpId="0" animBg="1"/>
+    </p:bldLst>
+  </p:timing>
+</p:sld>
+</file>
+
+<file path=ppt/slides/slide5.xml><?xml version="1.0" encoding="utf-8"?>
+<p:sld xmlns:a="http://schemas.openxmlformats.org/drawingml/2006/main" xmlns:r="http://schemas.openxmlformats.org/officeDocument/2006/relationships" xmlns:p="http://schemas.openxmlformats.org/presentationml/2006/main">
+  <p:cSld>
+    <p:bg>
+      <p:bgPr>
+        <a:blipFill dpi="0" rotWithShape="1">
+          <a:blip r:embed="rId2">
+            <a:lum/>
+            <a:extLst>
+              <a:ext uri="{837473B0-CC2E-450A-ABE3-18F120FF3D39}">
+                <a1611:picAttrSrcUrl xmlns:a1611="http://schemas.microsoft.com/office/drawing/2016/11/main" r:id="rId3"/>
+              </a:ext>
+            </a:extLst>
+          </a:blip>
+          <a:srcRect/>
+          <a:stretch>
+            <a:fillRect t="-39000" b="-39000"/>
+          </a:stretch>
+        </a:blipFill>
+        <a:effectLst/>
+      </p:bgPr>
+    </p:bg>
+    <p:spTree>
+      <p:nvGrpSpPr>
+        <p:cNvPr id="1" name=""/>
+        <p:cNvGrpSpPr/>
+        <p:nvPr/>
+      </p:nvGrpSpPr>
+      <p:grpSpPr>
+        <a:xfrm>
+          <a:off x="0" y="0"/>
+          <a:ext cx="0" cy="0"/>
+          <a:chOff x="0" y="0"/>
+          <a:chExt cx="0" cy="0"/>
+        </a:xfrm>
+      </p:grpSpPr>
+    </p:spTree>
+    <p:extLst>
+      <p:ext uri="{BB962C8B-B14F-4D97-AF65-F5344CB8AC3E}">
+        <p14:creationId xmlns:p14="http://schemas.microsoft.com/office/powerpoint/2010/main" val="348904147"/>
+      </p:ext>
+    </p:extLst>
+  </p:cSld>
+  <p:clrMapOvr>
+    <a:masterClrMapping/>
+  </p:clrMapOvr>
+  <mc:AlternateContent xmlns:mc="http://schemas.openxmlformats.org/markup-compatibility/2006">
+    <mc:Choice xmlns:p14="http://schemas.microsoft.com/office/powerpoint/2010/main" Requires="p14">
+      <p:transition spd="slow" p14:dur="1400">
+        <p14:ripple/>
+      </p:transition>
+    </mc:Choice>
+    <mc:Fallback>
+      <p:transition spd="slow">
+        <p:fade/>
+      </p:transition>
+    </mc:Fallback>
+  </mc:AlternateContent>
 </p:sld>
 </file>
 

</xml_diff>